<commit_message>
Finished research presentation, added new testing data for imaginary pulsar method
</commit_message>
<xml_diff>
--- a/Presentations/2021-07-12.pptx
+++ b/Presentations/2021-07-12.pptx
@@ -1,26 +1,30 @@
 
 <file path=ppt/presentation.xml><?xml version="1.0" encoding="utf-8"?>
-<p:presentation xmlns:a="http://schemas.openxmlformats.org/drawingml/2006/main" xmlns:r="http://schemas.openxmlformats.org/officeDocument/2006/relationships" xmlns:p="http://schemas.openxmlformats.org/presentationml/2006/main" saveSubsetFonts="1">
+<p:presentation xmlns:a="http://schemas.openxmlformats.org/drawingml/2006/main" xmlns:r="http://schemas.openxmlformats.org/officeDocument/2006/relationships" xmlns:p="http://schemas.openxmlformats.org/presentationml/2006/main" showSpecialPlsOnTitleSld="0" saveSubsetFonts="1">
   <p:sldMasterIdLst>
     <p:sldMasterId id="2147483648" r:id="rId1"/>
   </p:sldMasterIdLst>
   <p:notesMasterIdLst>
-    <p:notesMasterId r:id="rId15"/>
+    <p:notesMasterId r:id="rId19"/>
   </p:notesMasterIdLst>
   <p:sldIdLst>
     <p:sldId id="256" r:id="rId2"/>
     <p:sldId id="257" r:id="rId3"/>
-    <p:sldId id="258" r:id="rId4"/>
-    <p:sldId id="259" r:id="rId5"/>
-    <p:sldId id="261" r:id="rId6"/>
-    <p:sldId id="260" r:id="rId7"/>
-    <p:sldId id="266" r:id="rId8"/>
-    <p:sldId id="263" r:id="rId9"/>
-    <p:sldId id="264" r:id="rId10"/>
-    <p:sldId id="268" r:id="rId11"/>
-    <p:sldId id="262" r:id="rId12"/>
-    <p:sldId id="267" r:id="rId13"/>
-    <p:sldId id="265" r:id="rId14"/>
+    <p:sldId id="269" r:id="rId4"/>
+    <p:sldId id="258" r:id="rId5"/>
+    <p:sldId id="259" r:id="rId6"/>
+    <p:sldId id="261" r:id="rId7"/>
+    <p:sldId id="260" r:id="rId8"/>
+    <p:sldId id="266" r:id="rId9"/>
+    <p:sldId id="263" r:id="rId10"/>
+    <p:sldId id="264" r:id="rId11"/>
+    <p:sldId id="268" r:id="rId12"/>
+    <p:sldId id="262" r:id="rId13"/>
+    <p:sldId id="267" r:id="rId14"/>
+    <p:sldId id="270" r:id="rId15"/>
+    <p:sldId id="272" r:id="rId16"/>
+    <p:sldId id="265" r:id="rId17"/>
+    <p:sldId id="273" r:id="rId18"/>
   </p:sldIdLst>
   <p:sldSz cx="12192000" cy="6858000"/>
   <p:notesSz cx="6858000" cy="9144000"/>
@@ -209,7 +213,7 @@
           <a:p>
             <a:fld id="{10567F3F-64C1-40B2-8B63-E49E6F476A7A}" type="datetimeFigureOut">
               <a:rPr lang="en-US" smtClean="0"/>
-              <a:t>7/8/2021</a:t>
+              <a:t>7/11/2021</a:t>
             </a:fld>
             <a:endParaRPr lang="en-US"/>
           </a:p>
@@ -621,9 +625,9 @@
           <a:bodyPr/>
           <a:lstStyle/>
           <a:p>
-            <a:fld id="{7AD2D850-717C-47FF-B1FD-71DF7B4653E0}" type="datetimeFigureOut">
+            <a:fld id="{24AD4994-58AE-449C-8DA0-9FFD94ED0992}" type="datetime1">
               <a:rPr lang="en-US" smtClean="0"/>
-              <a:t>7/8/2021</a:t>
+              <a:t>7/11/2021</a:t>
             </a:fld>
             <a:endParaRPr lang="en-US"/>
           </a:p>
@@ -819,9 +823,9 @@
           <a:bodyPr/>
           <a:lstStyle/>
           <a:p>
-            <a:fld id="{7AD2D850-717C-47FF-B1FD-71DF7B4653E0}" type="datetimeFigureOut">
+            <a:fld id="{5A6F09FE-9606-4030-B0E4-09BD2095419C}" type="datetime1">
               <a:rPr lang="en-US" smtClean="0"/>
-              <a:t>7/8/2021</a:t>
+              <a:t>7/11/2021</a:t>
             </a:fld>
             <a:endParaRPr lang="en-US"/>
           </a:p>
@@ -1027,9 +1031,9 @@
           <a:bodyPr/>
           <a:lstStyle/>
           <a:p>
-            <a:fld id="{7AD2D850-717C-47FF-B1FD-71DF7B4653E0}" type="datetimeFigureOut">
+            <a:fld id="{86333B3B-0214-4460-81B8-FBF544A49F60}" type="datetime1">
               <a:rPr lang="en-US" smtClean="0"/>
-              <a:t>7/8/2021</a:t>
+              <a:t>7/11/2021</a:t>
             </a:fld>
             <a:endParaRPr lang="en-US"/>
           </a:p>
@@ -1233,13 +1237,18 @@
         <p:spPr/>
         <p:txBody>
           <a:bodyPr/>
-          <a:lstStyle/>
-          <a:p>
-            <a:fld id="{7AD2D850-717C-47FF-B1FD-71DF7B4653E0}" type="datetimeFigureOut">
+          <a:lstStyle>
+            <a:lvl1pPr>
+              <a:defRPr sz="1600"/>
+            </a:lvl1pPr>
+          </a:lstStyle>
+          <a:p>
+            <a:fld id="{CF75B73F-1735-404F-9F87-978140636095}" type="datetime1">
               <a:rPr lang="en-US" smtClean="0"/>
-              <a:t>7/8/2021</a:t>
+              <a:pPr/>
+              <a:t>7/11/2021</a:t>
             </a:fld>
-            <a:endParaRPr lang="en-US"/>
+            <a:endParaRPr lang="en-US" dirty="0"/>
           </a:p>
         </p:txBody>
       </p:sp>
@@ -1262,9 +1271,13 @@
         <p:spPr/>
         <p:txBody>
           <a:bodyPr/>
-          <a:lstStyle/>
-          <a:p>
-            <a:endParaRPr lang="en-US"/>
+          <a:lstStyle>
+            <a:lvl1pPr>
+              <a:defRPr sz="1600"/>
+            </a:lvl1pPr>
+          </a:lstStyle>
+          <a:p>
+            <a:endParaRPr lang="en-US" dirty="0"/>
           </a:p>
         </p:txBody>
       </p:sp>
@@ -1287,13 +1300,18 @@
         <p:spPr/>
         <p:txBody>
           <a:bodyPr/>
-          <a:lstStyle/>
+          <a:lstStyle>
+            <a:lvl1pPr>
+              <a:defRPr sz="1600"/>
+            </a:lvl1pPr>
+          </a:lstStyle>
           <a:p>
             <a:fld id="{1CFD15D6-A40B-45EE-A88B-B645EAC7DF78}" type="slidenum">
               <a:rPr lang="en-US" smtClean="0"/>
+              <a:pPr/>
               <a:t>‹#›</a:t>
             </a:fld>
-            <a:endParaRPr lang="en-US"/>
+            <a:endParaRPr lang="en-US" dirty="0"/>
           </a:p>
         </p:txBody>
       </p:sp>
@@ -1510,9 +1528,9 @@
           <a:bodyPr/>
           <a:lstStyle/>
           <a:p>
-            <a:fld id="{7AD2D850-717C-47FF-B1FD-71DF7B4653E0}" type="datetimeFigureOut">
+            <a:fld id="{155511D0-AAAB-4727-8E10-2FF5CF5C576E}" type="datetime1">
               <a:rPr lang="en-US" smtClean="0"/>
-              <a:t>7/8/2021</a:t>
+              <a:t>7/11/2021</a:t>
             </a:fld>
             <a:endParaRPr lang="en-US"/>
           </a:p>
@@ -1775,9 +1793,9 @@
           <a:bodyPr/>
           <a:lstStyle/>
           <a:p>
-            <a:fld id="{7AD2D850-717C-47FF-B1FD-71DF7B4653E0}" type="datetimeFigureOut">
+            <a:fld id="{E792FD8A-C9E5-49D4-8D8F-3874D719B0A9}" type="datetime1">
               <a:rPr lang="en-US" smtClean="0"/>
-              <a:t>7/8/2021</a:t>
+              <a:t>7/11/2021</a:t>
             </a:fld>
             <a:endParaRPr lang="en-US"/>
           </a:p>
@@ -2187,9 +2205,9 @@
           <a:bodyPr/>
           <a:lstStyle/>
           <a:p>
-            <a:fld id="{7AD2D850-717C-47FF-B1FD-71DF7B4653E0}" type="datetimeFigureOut">
+            <a:fld id="{CFE83C31-E36C-48B8-AF3C-146AFF3B27BB}" type="datetime1">
               <a:rPr lang="en-US" smtClean="0"/>
-              <a:t>7/8/2021</a:t>
+              <a:t>7/11/2021</a:t>
             </a:fld>
             <a:endParaRPr lang="en-US"/>
           </a:p>
@@ -2328,9 +2346,9 @@
           <a:bodyPr/>
           <a:lstStyle/>
           <a:p>
-            <a:fld id="{7AD2D850-717C-47FF-B1FD-71DF7B4653E0}" type="datetimeFigureOut">
+            <a:fld id="{DB390E49-6E70-47E7-901C-47E53E498A34}" type="datetime1">
               <a:rPr lang="en-US" smtClean="0"/>
-              <a:t>7/8/2021</a:t>
+              <a:t>7/11/2021</a:t>
             </a:fld>
             <a:endParaRPr lang="en-US"/>
           </a:p>
@@ -2441,9 +2459,9 @@
           <a:bodyPr/>
           <a:lstStyle/>
           <a:p>
-            <a:fld id="{7AD2D850-717C-47FF-B1FD-71DF7B4653E0}" type="datetimeFigureOut">
+            <a:fld id="{9A560052-8F8E-4A81-9B11-43E88F523A00}" type="datetime1">
               <a:rPr lang="en-US" smtClean="0"/>
-              <a:t>7/8/2021</a:t>
+              <a:t>7/11/2021</a:t>
             </a:fld>
             <a:endParaRPr lang="en-US"/>
           </a:p>
@@ -2752,9 +2770,9 @@
           <a:bodyPr/>
           <a:lstStyle/>
           <a:p>
-            <a:fld id="{7AD2D850-717C-47FF-B1FD-71DF7B4653E0}" type="datetimeFigureOut">
+            <a:fld id="{4861BC76-DA65-4DCE-BFEC-CC80D6384424}" type="datetime1">
               <a:rPr lang="en-US" smtClean="0"/>
-              <a:t>7/8/2021</a:t>
+              <a:t>7/11/2021</a:t>
             </a:fld>
             <a:endParaRPr lang="en-US"/>
           </a:p>
@@ -3040,9 +3058,9 @@
           <a:bodyPr/>
           <a:lstStyle/>
           <a:p>
-            <a:fld id="{7AD2D850-717C-47FF-B1FD-71DF7B4653E0}" type="datetimeFigureOut">
+            <a:fld id="{02DCD5AD-E6C4-4A90-B20F-B1689F588F81}" type="datetime1">
               <a:rPr lang="en-US" smtClean="0"/>
-              <a:t>7/8/2021</a:t>
+              <a:t>7/11/2021</a:t>
             </a:fld>
             <a:endParaRPr lang="en-US"/>
           </a:p>
@@ -3281,9 +3299,9 @@
             </a:lvl1pPr>
           </a:lstStyle>
           <a:p>
-            <a:fld id="{7AD2D850-717C-47FF-B1FD-71DF7B4653E0}" type="datetimeFigureOut">
+            <a:fld id="{75C3593B-1258-4939-8B1C-3EB16AC93939}" type="datetime1">
               <a:rPr lang="en-US" smtClean="0"/>
-              <a:t>7/8/2021</a:t>
+              <a:t>7/11/2021</a:t>
             </a:fld>
             <a:endParaRPr lang="en-US"/>
           </a:p>
@@ -3400,6 +3418,7 @@
     <p:sldLayoutId id="2147483658" r:id="rId10"/>
     <p:sldLayoutId id="2147483659" r:id="rId11"/>
   </p:sldLayoutIdLst>
+  <p:hf hdr="0" ftr="0" dt="0"/>
   <p:txStyles>
     <p:titleStyle>
       <a:lvl1pPr algn="l" defTabSz="914400" rtl="0" eaLnBrk="1" latinLnBrk="0" hangingPunct="1">
@@ -3791,6 +3810,227 @@
           <p:cNvPr id="2" name="Title 1">
             <a:extLst>
               <a:ext uri="{FF2B5EF4-FFF2-40B4-BE49-F238E27FC236}">
+                <a16:creationId xmlns:a16="http://schemas.microsoft.com/office/drawing/2014/main" id="{205C4D7F-2FD4-4530-A462-415927F5E6DB}"/>
+              </a:ext>
+            </a:extLst>
+          </p:cNvPr>
+          <p:cNvSpPr>
+            <a:spLocks noGrp="1"/>
+          </p:cNvSpPr>
+          <p:nvPr>
+            <p:ph type="title"/>
+          </p:nvPr>
+        </p:nvSpPr>
+        <p:spPr/>
+        <p:txBody>
+          <a:bodyPr/>
+          <a:lstStyle/>
+          <a:p>
+            <a:r>
+              <a:rPr lang="en-US" dirty="0"/>
+              <a:t>Limitations</a:t>
+            </a:r>
+          </a:p>
+        </p:txBody>
+      </p:sp>
+      <p:sp>
+        <p:nvSpPr>
+          <p:cNvPr id="3" name="Content Placeholder 2">
+            <a:extLst>
+              <a:ext uri="{FF2B5EF4-FFF2-40B4-BE49-F238E27FC236}">
+                <a16:creationId xmlns:a16="http://schemas.microsoft.com/office/drawing/2014/main" id="{0ED87FD4-D0BD-4585-905B-8EE883AFD86B}"/>
+              </a:ext>
+            </a:extLst>
+          </p:cNvPr>
+          <p:cNvSpPr>
+            <a:spLocks noGrp="1"/>
+          </p:cNvSpPr>
+          <p:nvPr>
+            <p:ph idx="1"/>
+          </p:nvPr>
+        </p:nvSpPr>
+        <p:spPr/>
+        <p:txBody>
+          <a:bodyPr>
+            <a:normAutofit/>
+          </a:bodyPr>
+          <a:lstStyle/>
+          <a:p>
+            <a:pPr>
+              <a:lnSpc>
+                <a:spcPct val="100000"/>
+              </a:lnSpc>
+            </a:pPr>
+            <a:r>
+              <a:rPr lang="en-US" dirty="0"/>
+              <a:t>Slow compared to analytic OD methods</a:t>
+            </a:r>
+          </a:p>
+          <a:p>
+            <a:pPr lvl="1">
+              <a:lnSpc>
+                <a:spcPct val="100000"/>
+              </a:lnSpc>
+            </a:pPr>
+            <a:r>
+              <a:rPr lang="en-US" dirty="0"/>
+              <a:t>6-10 seconds per run, depending on number of measurements &amp; grid size</a:t>
+            </a:r>
+          </a:p>
+          <a:p>
+            <a:pPr>
+              <a:lnSpc>
+                <a:spcPct val="100000"/>
+              </a:lnSpc>
+            </a:pPr>
+            <a:r>
+              <a:rPr lang="en-US" dirty="0"/>
+              <a:t>Certain orbits need finer search</a:t>
+            </a:r>
+          </a:p>
+          <a:p>
+            <a:pPr lvl="1">
+              <a:lnSpc>
+                <a:spcPct val="100000"/>
+              </a:lnSpc>
+            </a:pPr>
+            <a:r>
+              <a:rPr lang="en-US" dirty="0"/>
+              <a:t>Some orbits only need 25^3, while others need 35^3</a:t>
+            </a:r>
+          </a:p>
+          <a:p>
+            <a:pPr lvl="1">
+              <a:lnSpc>
+                <a:spcPct val="100000"/>
+              </a:lnSpc>
+            </a:pPr>
+            <a:r>
+              <a:rPr lang="en-US" dirty="0"/>
+              <a:t>Unclear which orbits. Heuristically:</a:t>
+            </a:r>
+          </a:p>
+          <a:p>
+            <a:pPr lvl="2">
+              <a:lnSpc>
+                <a:spcPct val="100000"/>
+              </a:lnSpc>
+            </a:pPr>
+            <a:r>
+              <a:rPr lang="en-US" dirty="0"/>
+              <a:t>Eccentricity near 0 or 1</a:t>
+            </a:r>
+          </a:p>
+          <a:p>
+            <a:pPr lvl="2">
+              <a:lnSpc>
+                <a:spcPct val="100000"/>
+              </a:lnSpc>
+            </a:pPr>
+            <a:r>
+              <a:rPr lang="en-US" dirty="0"/>
+              <a:t>Mean anomaly span near 0</a:t>
+            </a:r>
+          </a:p>
+          <a:p>
+            <a:pPr>
+              <a:lnSpc>
+                <a:spcPct val="100000"/>
+              </a:lnSpc>
+            </a:pPr>
+            <a:r>
+              <a:rPr lang="en-US" dirty="0"/>
+              <a:t>Currently only for elliptic orbits + measurements within 1 orbit period</a:t>
+            </a:r>
+          </a:p>
+          <a:p>
+            <a:pPr lvl="1">
+              <a:lnSpc>
+                <a:spcPct val="100000"/>
+              </a:lnSpc>
+            </a:pPr>
+            <a:r>
+              <a:rPr lang="en-US" dirty="0"/>
+              <a:t>Work in progress – should be easy to fix these</a:t>
+            </a:r>
+          </a:p>
+          <a:p>
+            <a:pPr>
+              <a:lnSpc>
+                <a:spcPct val="100000"/>
+              </a:lnSpc>
+            </a:pPr>
+            <a:r>
+              <a:rPr lang="en-US" dirty="0"/>
+              <a:t>Proof that global min exists and is near true solution?</a:t>
+            </a:r>
+          </a:p>
+        </p:txBody>
+      </p:sp>
+      <p:sp>
+        <p:nvSpPr>
+          <p:cNvPr id="4" name="Slide Number Placeholder 3">
+            <a:extLst>
+              <a:ext uri="{FF2B5EF4-FFF2-40B4-BE49-F238E27FC236}">
+                <a16:creationId xmlns:a16="http://schemas.microsoft.com/office/drawing/2014/main" id="{A86CF7F9-7B86-4B92-BE28-8F651D401BD2}"/>
+              </a:ext>
+            </a:extLst>
+          </p:cNvPr>
+          <p:cNvSpPr>
+            <a:spLocks noGrp="1"/>
+          </p:cNvSpPr>
+          <p:nvPr>
+            <p:ph type="sldNum" sz="quarter" idx="12"/>
+          </p:nvPr>
+        </p:nvSpPr>
+        <p:spPr/>
+        <p:txBody>
+          <a:bodyPr/>
+          <a:lstStyle/>
+          <a:p>
+            <a:fld id="{1CFD15D6-A40B-45EE-A88B-B645EAC7DF78}" type="slidenum">
+              <a:rPr lang="en-US" smtClean="0"/>
+              <a:t>10</a:t>
+            </a:fld>
+            <a:endParaRPr lang="en-US"/>
+          </a:p>
+        </p:txBody>
+      </p:sp>
+    </p:spTree>
+    <p:extLst>
+      <p:ext uri="{BB962C8B-B14F-4D97-AF65-F5344CB8AC3E}">
+        <p14:creationId xmlns:p14="http://schemas.microsoft.com/office/powerpoint/2010/main" val="1976062533"/>
+      </p:ext>
+    </p:extLst>
+  </p:cSld>
+  <p:clrMapOvr>
+    <a:masterClrMapping/>
+  </p:clrMapOvr>
+</p:sld>
+</file>
+
+<file path=ppt/slides/slide11.xml><?xml version="1.0" encoding="utf-8"?>
+<p:sld xmlns:a="http://schemas.openxmlformats.org/drawingml/2006/main" xmlns:r="http://schemas.openxmlformats.org/officeDocument/2006/relationships" xmlns:p="http://schemas.openxmlformats.org/presentationml/2006/main">
+  <p:cSld>
+    <p:spTree>
+      <p:nvGrpSpPr>
+        <p:cNvPr id="1" name=""/>
+        <p:cNvGrpSpPr/>
+        <p:nvPr/>
+      </p:nvGrpSpPr>
+      <p:grpSpPr>
+        <a:xfrm>
+          <a:off x="0" y="0"/>
+          <a:ext cx="0" cy="0"/>
+          <a:chOff x="0" y="0"/>
+          <a:chExt cx="0" cy="0"/>
+        </a:xfrm>
+      </p:grpSpPr>
+      <p:sp>
+        <p:nvSpPr>
+          <p:cNvPr id="2" name="Title 1">
+            <a:extLst>
+              <a:ext uri="{FF2B5EF4-FFF2-40B4-BE49-F238E27FC236}">
                 <a16:creationId xmlns:a16="http://schemas.microsoft.com/office/drawing/2014/main" id="{635C0203-5054-4B97-957A-BE93C4CDD54E}"/>
               </a:ext>
             </a:extLst>
@@ -3888,7 +4128,7 @@
                 </a14:m>
                 <a:r>
                   <a:rPr lang="en-US" dirty="0"/>
-                  <a:t>, take measurements from pulsars </a:t>
+                  <a:t>, take range-rate to pulsars </a:t>
                 </a:r>
                 <a14:m>
                   <m:oMath xmlns:m="http://schemas.openxmlformats.org/officeDocument/2006/math">
@@ -4443,6 +4683,35 @@
           </p:sp>
         </mc:Fallback>
       </mc:AlternateContent>
+      <p:sp>
+        <p:nvSpPr>
+          <p:cNvPr id="4" name="Slide Number Placeholder 3">
+            <a:extLst>
+              <a:ext uri="{FF2B5EF4-FFF2-40B4-BE49-F238E27FC236}">
+                <a16:creationId xmlns:a16="http://schemas.microsoft.com/office/drawing/2014/main" id="{FCEB4AFC-A10C-4D9B-98A2-091AFB9EB1B1}"/>
+              </a:ext>
+            </a:extLst>
+          </p:cNvPr>
+          <p:cNvSpPr>
+            <a:spLocks noGrp="1"/>
+          </p:cNvSpPr>
+          <p:nvPr>
+            <p:ph type="sldNum" sz="quarter" idx="12"/>
+          </p:nvPr>
+        </p:nvSpPr>
+        <p:spPr/>
+        <p:txBody>
+          <a:bodyPr/>
+          <a:lstStyle/>
+          <a:p>
+            <a:fld id="{1CFD15D6-A40B-45EE-A88B-B645EAC7DF78}" type="slidenum">
+              <a:rPr lang="en-US" smtClean="0"/>
+              <a:t>11</a:t>
+            </a:fld>
+            <a:endParaRPr lang="en-US"/>
+          </a:p>
+        </p:txBody>
+      </p:sp>
     </p:spTree>
     <p:extLst>
       <p:ext uri="{BB962C8B-B14F-4D97-AF65-F5344CB8AC3E}">
@@ -4456,7 +4725,7 @@
 </p:sld>
 </file>
 
-<file path=ppt/slides/slide11.xml><?xml version="1.0" encoding="utf-8"?>
+<file path=ppt/slides/slide12.xml><?xml version="1.0" encoding="utf-8"?>
 <p:sld xmlns:a="http://schemas.openxmlformats.org/drawingml/2006/main" xmlns:r="http://schemas.openxmlformats.org/officeDocument/2006/relationships" xmlns:p="http://schemas.openxmlformats.org/presentationml/2006/main">
   <p:cSld>
     <p:spTree>
@@ -4713,6 +4982,35 @@
           </a:p>
         </p:txBody>
       </p:sp>
+      <p:sp>
+        <p:nvSpPr>
+          <p:cNvPr id="3" name="Slide Number Placeholder 2">
+            <a:extLst>
+              <a:ext uri="{FF2B5EF4-FFF2-40B4-BE49-F238E27FC236}">
+                <a16:creationId xmlns:a16="http://schemas.microsoft.com/office/drawing/2014/main" id="{ED6F8A2F-2486-4EF5-ADDF-1B8DE8EB85BA}"/>
+              </a:ext>
+            </a:extLst>
+          </p:cNvPr>
+          <p:cNvSpPr>
+            <a:spLocks noGrp="1"/>
+          </p:cNvSpPr>
+          <p:nvPr>
+            <p:ph type="sldNum" sz="quarter" idx="12"/>
+          </p:nvPr>
+        </p:nvSpPr>
+        <p:spPr/>
+        <p:txBody>
+          <a:bodyPr/>
+          <a:lstStyle/>
+          <a:p>
+            <a:fld id="{1CFD15D6-A40B-45EE-A88B-B645EAC7DF78}" type="slidenum">
+              <a:rPr lang="en-US" smtClean="0"/>
+              <a:t>12</a:t>
+            </a:fld>
+            <a:endParaRPr lang="en-US"/>
+          </a:p>
+        </p:txBody>
+      </p:sp>
     </p:spTree>
     <p:extLst>
       <p:ext uri="{BB962C8B-B14F-4D97-AF65-F5344CB8AC3E}">
@@ -4726,7 +5024,7 @@
 </p:sld>
 </file>
 
-<file path=ppt/slides/slide12.xml><?xml version="1.0" encoding="utf-8"?>
+<file path=ppt/slides/slide13.xml><?xml version="1.0" encoding="utf-8"?>
 <p:sld xmlns:a="http://schemas.openxmlformats.org/drawingml/2006/main" xmlns:r="http://schemas.openxmlformats.org/officeDocument/2006/relationships" xmlns:p="http://schemas.openxmlformats.org/presentationml/2006/main">
   <p:cSld>
     <p:spTree>
@@ -4891,7 +5189,7 @@
             </a:r>
             <a:r>
               <a:rPr lang="en-US" dirty="0"/>
-              <a:t>-VIOD does not improve better than regular VIOD in this case</a:t>
+              <a:t>-VIOD does not perform better than regular VIOD in this case</a:t>
             </a:r>
           </a:p>
           <a:p>
@@ -4902,6 +5200,35 @@
               <a:rPr lang="en-US" dirty="0"/>
               <a:t>Neptune case not shown – RROD is about two orders of magnitude better</a:t>
             </a:r>
+          </a:p>
+        </p:txBody>
+      </p:sp>
+      <p:sp>
+        <p:nvSpPr>
+          <p:cNvPr id="3" name="Slide Number Placeholder 2">
+            <a:extLst>
+              <a:ext uri="{FF2B5EF4-FFF2-40B4-BE49-F238E27FC236}">
+                <a16:creationId xmlns:a16="http://schemas.microsoft.com/office/drawing/2014/main" id="{90BDDC27-E32D-49A1-A793-47A6044B6362}"/>
+              </a:ext>
+            </a:extLst>
+          </p:cNvPr>
+          <p:cNvSpPr>
+            <a:spLocks noGrp="1"/>
+          </p:cNvSpPr>
+          <p:nvPr>
+            <p:ph type="sldNum" sz="quarter" idx="12"/>
+          </p:nvPr>
+        </p:nvSpPr>
+        <p:spPr/>
+        <p:txBody>
+          <a:bodyPr/>
+          <a:lstStyle/>
+          <a:p>
+            <a:fld id="{1CFD15D6-A40B-45EE-A88B-B645EAC7DF78}" type="slidenum">
+              <a:rPr lang="en-US" smtClean="0"/>
+              <a:t>13</a:t>
+            </a:fld>
+            <a:endParaRPr lang="en-US"/>
           </a:p>
         </p:txBody>
       </p:sp>
@@ -4918,7 +5245,453 @@
 </p:sld>
 </file>
 
-<file path=ppt/slides/slide13.xml><?xml version="1.0" encoding="utf-8"?>
+<file path=ppt/slides/slide14.xml><?xml version="1.0" encoding="utf-8"?>
+<p:sld xmlns:a="http://schemas.openxmlformats.org/drawingml/2006/main" xmlns:r="http://schemas.openxmlformats.org/officeDocument/2006/relationships" xmlns:p="http://schemas.openxmlformats.org/presentationml/2006/main">
+  <p:cSld>
+    <p:spTree>
+      <p:nvGrpSpPr>
+        <p:cNvPr id="1" name=""/>
+        <p:cNvGrpSpPr/>
+        <p:nvPr/>
+      </p:nvGrpSpPr>
+      <p:grpSpPr>
+        <a:xfrm>
+          <a:off x="0" y="0"/>
+          <a:ext cx="0" cy="0"/>
+          <a:chOff x="0" y="0"/>
+          <a:chExt cx="0" cy="0"/>
+        </a:xfrm>
+      </p:grpSpPr>
+      <p:sp>
+        <p:nvSpPr>
+          <p:cNvPr id="2" name="Title 1">
+            <a:extLst>
+              <a:ext uri="{FF2B5EF4-FFF2-40B4-BE49-F238E27FC236}">
+                <a16:creationId xmlns:a16="http://schemas.microsoft.com/office/drawing/2014/main" id="{2DD58CD3-6C05-481F-B79F-F552FC981E4B}"/>
+              </a:ext>
+            </a:extLst>
+          </p:cNvPr>
+          <p:cNvSpPr>
+            <a:spLocks noGrp="1"/>
+          </p:cNvSpPr>
+          <p:nvPr>
+            <p:ph type="title"/>
+          </p:nvPr>
+        </p:nvSpPr>
+        <p:spPr/>
+        <p:txBody>
+          <a:bodyPr/>
+          <a:lstStyle/>
+          <a:p>
+            <a:r>
+              <a:rPr lang="en-US" dirty="0"/>
+              <a:t>Using Imaginary Pulsars</a:t>
+            </a:r>
+          </a:p>
+        </p:txBody>
+      </p:sp>
+      <p:pic>
+        <p:nvPicPr>
+          <p:cNvPr id="6" name="Content Placeholder 5" descr="Chart, bar chart&#10;&#10;Description automatically generated">
+            <a:extLst>
+              <a:ext uri="{FF2B5EF4-FFF2-40B4-BE49-F238E27FC236}">
+                <a16:creationId xmlns:a16="http://schemas.microsoft.com/office/drawing/2014/main" id="{EF1B1ED9-D16C-4002-9888-2ABDB9967BD8}"/>
+              </a:ext>
+            </a:extLst>
+          </p:cNvPr>
+          <p:cNvPicPr>
+            <a:picLocks noGrp="1" noChangeAspect="1"/>
+          </p:cNvPicPr>
+          <p:nvPr>
+            <p:ph idx="1"/>
+          </p:nvPr>
+        </p:nvPicPr>
+        <p:blipFill>
+          <a:blip r:embed="rId2">
+            <a:extLst>
+              <a:ext uri="{28A0092B-C50C-407E-A947-70E740481C1C}">
+                <a14:useLocalDpi xmlns:a14="http://schemas.microsoft.com/office/drawing/2010/main" val="0"/>
+              </a:ext>
+            </a:extLst>
+          </a:blip>
+          <a:stretch>
+            <a:fillRect/>
+          </a:stretch>
+        </p:blipFill>
+        <p:spPr>
+          <a:xfrm>
+            <a:off x="1222195" y="1330193"/>
+            <a:ext cx="6330950" cy="4748213"/>
+          </a:xfrm>
+        </p:spPr>
+      </p:pic>
+      <p:sp>
+        <p:nvSpPr>
+          <p:cNvPr id="4" name="Slide Number Placeholder 3">
+            <a:extLst>
+              <a:ext uri="{FF2B5EF4-FFF2-40B4-BE49-F238E27FC236}">
+                <a16:creationId xmlns:a16="http://schemas.microsoft.com/office/drawing/2014/main" id="{F9B90511-7A45-47AF-BFE9-BB5884AFCBDE}"/>
+              </a:ext>
+            </a:extLst>
+          </p:cNvPr>
+          <p:cNvSpPr>
+            <a:spLocks noGrp="1"/>
+          </p:cNvSpPr>
+          <p:nvPr>
+            <p:ph type="sldNum" sz="quarter" idx="12"/>
+          </p:nvPr>
+        </p:nvSpPr>
+        <p:spPr/>
+        <p:txBody>
+          <a:bodyPr/>
+          <a:lstStyle/>
+          <a:p>
+            <a:fld id="{1CFD15D6-A40B-45EE-A88B-B645EAC7DF78}" type="slidenum">
+              <a:rPr lang="en-US" smtClean="0"/>
+              <a:pPr/>
+              <a:t>14</a:t>
+            </a:fld>
+            <a:endParaRPr lang="en-US" dirty="0"/>
+          </a:p>
+        </p:txBody>
+      </p:sp>
+      <p:sp>
+        <p:nvSpPr>
+          <p:cNvPr id="7" name="TextBox 6">
+            <a:extLst>
+              <a:ext uri="{FF2B5EF4-FFF2-40B4-BE49-F238E27FC236}">
+                <a16:creationId xmlns:a16="http://schemas.microsoft.com/office/drawing/2014/main" id="{424DEC97-7AA3-4231-9D59-DD5918D5DE9D}"/>
+              </a:ext>
+            </a:extLst>
+          </p:cNvPr>
+          <p:cNvSpPr txBox="1"/>
+          <p:nvPr/>
+        </p:nvSpPr>
+        <p:spPr>
+          <a:xfrm>
+            <a:off x="7631083" y="1706880"/>
+            <a:ext cx="3929150" cy="3416320"/>
+          </a:xfrm>
+          <a:prstGeom prst="rect">
+            <a:avLst/>
+          </a:prstGeom>
+          <a:noFill/>
+        </p:spPr>
+        <p:txBody>
+          <a:bodyPr wrap="square" rtlCol="0">
+            <a:spAutoFit/>
+          </a:bodyPr>
+          <a:lstStyle/>
+          <a:p>
+            <a:r>
+              <a:rPr lang="en-US" dirty="0"/>
+              <a:t>What if we create range-rate data from velocity vectors?</a:t>
+            </a:r>
+          </a:p>
+          <a:p>
+            <a:pPr marL="285750" indent="-285750">
+              <a:buFontTx/>
+              <a:buChar char="-"/>
+            </a:pPr>
+            <a:r>
+              <a:rPr lang="en-US" dirty="0"/>
+              <a:t>Fairest possible comparison – RROD has no accesses to additional data</a:t>
+            </a:r>
+          </a:p>
+          <a:p>
+            <a:pPr marL="285750" indent="-285750">
+              <a:buFontTx/>
+              <a:buChar char="-"/>
+            </a:pPr>
+            <a:endParaRPr lang="en-US" dirty="0"/>
+          </a:p>
+          <a:p>
+            <a:r>
+              <a:rPr lang="en-US" dirty="0" err="1"/>
+              <a:t>RROD_Im</a:t>
+            </a:r>
+            <a:r>
+              <a:rPr lang="en-US" dirty="0"/>
+              <a:t> method pretends that the x-, y-, and z-axis values of the velocity vector used for VIOD are its range-rate measurements</a:t>
+            </a:r>
+          </a:p>
+          <a:p>
+            <a:endParaRPr lang="en-US" dirty="0"/>
+          </a:p>
+          <a:p>
+            <a:r>
+              <a:rPr lang="en-US" dirty="0" err="1"/>
+              <a:t>RROD_Im</a:t>
+            </a:r>
+            <a:r>
+              <a:rPr lang="en-US" dirty="0"/>
+              <a:t> still performs better than VIOD!</a:t>
+            </a:r>
+          </a:p>
+        </p:txBody>
+      </p:sp>
+      <p:sp>
+        <p:nvSpPr>
+          <p:cNvPr id="8" name="TextBox 7">
+            <a:extLst>
+              <a:ext uri="{FF2B5EF4-FFF2-40B4-BE49-F238E27FC236}">
+                <a16:creationId xmlns:a16="http://schemas.microsoft.com/office/drawing/2014/main" id="{4A874A2F-B077-4959-B283-56B71F2F312E}"/>
+              </a:ext>
+            </a:extLst>
+          </p:cNvPr>
+          <p:cNvSpPr txBox="1"/>
+          <p:nvPr/>
+        </p:nvSpPr>
+        <p:spPr>
+          <a:xfrm>
+            <a:off x="1492209" y="5971421"/>
+            <a:ext cx="5671902" cy="646331"/>
+          </a:xfrm>
+          <a:prstGeom prst="rect">
+            <a:avLst/>
+          </a:prstGeom>
+          <a:noFill/>
+        </p:spPr>
+        <p:txBody>
+          <a:bodyPr wrap="square" rtlCol="0">
+            <a:spAutoFit/>
+          </a:bodyPr>
+          <a:lstStyle/>
+          <a:p>
+            <a:r>
+              <a:rPr lang="en-US" dirty="0"/>
+              <a:t>Earth-Mars Hohmann transfer, e = 0.21, f0 = 90 deg</a:t>
+            </a:r>
+          </a:p>
+          <a:p>
+            <a:r>
+              <a:rPr lang="en-US" dirty="0"/>
+              <a:t>dT = 25 days (5%), noise = 0.5m/s, #obsv = 20, #sim = 100</a:t>
+            </a:r>
+          </a:p>
+        </p:txBody>
+      </p:sp>
+    </p:spTree>
+    <p:extLst>
+      <p:ext uri="{BB962C8B-B14F-4D97-AF65-F5344CB8AC3E}">
+        <p14:creationId xmlns:p14="http://schemas.microsoft.com/office/powerpoint/2010/main" val="1345287258"/>
+      </p:ext>
+    </p:extLst>
+  </p:cSld>
+  <p:clrMapOvr>
+    <a:masterClrMapping/>
+  </p:clrMapOvr>
+</p:sld>
+</file>
+
+<file path=ppt/slides/slide15.xml><?xml version="1.0" encoding="utf-8"?>
+<p:sld xmlns:a="http://schemas.openxmlformats.org/drawingml/2006/main" xmlns:r="http://schemas.openxmlformats.org/officeDocument/2006/relationships" xmlns:p="http://schemas.openxmlformats.org/presentationml/2006/main">
+  <p:cSld>
+    <p:spTree>
+      <p:nvGrpSpPr>
+        <p:cNvPr id="1" name=""/>
+        <p:cNvGrpSpPr/>
+        <p:nvPr/>
+      </p:nvGrpSpPr>
+      <p:grpSpPr>
+        <a:xfrm>
+          <a:off x="0" y="0"/>
+          <a:ext cx="0" cy="0"/>
+          <a:chOff x="0" y="0"/>
+          <a:chExt cx="0" cy="0"/>
+        </a:xfrm>
+      </p:grpSpPr>
+      <p:sp>
+        <p:nvSpPr>
+          <p:cNvPr id="2" name="Title 1">
+            <a:extLst>
+              <a:ext uri="{FF2B5EF4-FFF2-40B4-BE49-F238E27FC236}">
+                <a16:creationId xmlns:a16="http://schemas.microsoft.com/office/drawing/2014/main" id="{2DD58CD3-6C05-481F-B79F-F552FC981E4B}"/>
+              </a:ext>
+            </a:extLst>
+          </p:cNvPr>
+          <p:cNvSpPr>
+            <a:spLocks noGrp="1"/>
+          </p:cNvSpPr>
+          <p:nvPr>
+            <p:ph type="title"/>
+          </p:nvPr>
+        </p:nvSpPr>
+        <p:spPr/>
+        <p:txBody>
+          <a:bodyPr/>
+          <a:lstStyle/>
+          <a:p>
+            <a:r>
+              <a:rPr lang="en-US" dirty="0"/>
+              <a:t>Using Imaginary Pulsars</a:t>
+            </a:r>
+          </a:p>
+        </p:txBody>
+      </p:sp>
+      <p:pic>
+        <p:nvPicPr>
+          <p:cNvPr id="6" name="Content Placeholder 5">
+            <a:extLst>
+              <a:ext uri="{FF2B5EF4-FFF2-40B4-BE49-F238E27FC236}">
+                <a16:creationId xmlns:a16="http://schemas.microsoft.com/office/drawing/2014/main" id="{EF1B1ED9-D16C-4002-9888-2ABDB9967BD8}"/>
+              </a:ext>
+            </a:extLst>
+          </p:cNvPr>
+          <p:cNvPicPr>
+            <a:picLocks noGrp="1" noChangeAspect="1"/>
+          </p:cNvPicPr>
+          <p:nvPr>
+            <p:ph idx="1"/>
+          </p:nvPr>
+        </p:nvPicPr>
+        <p:blipFill>
+          <a:blip r:embed="rId2">
+            <a:extLst>
+              <a:ext uri="{28A0092B-C50C-407E-A947-70E740481C1C}">
+                <a14:useLocalDpi xmlns:a14="http://schemas.microsoft.com/office/drawing/2010/main" val="0"/>
+              </a:ext>
+            </a:extLst>
+          </a:blip>
+          <a:srcRect/>
+          <a:stretch/>
+        </p:blipFill>
+        <p:spPr>
+          <a:xfrm>
+            <a:off x="1222195" y="1330193"/>
+            <a:ext cx="6330950" cy="4748212"/>
+          </a:xfrm>
+        </p:spPr>
+      </p:pic>
+      <p:sp>
+        <p:nvSpPr>
+          <p:cNvPr id="4" name="Slide Number Placeholder 3">
+            <a:extLst>
+              <a:ext uri="{FF2B5EF4-FFF2-40B4-BE49-F238E27FC236}">
+                <a16:creationId xmlns:a16="http://schemas.microsoft.com/office/drawing/2014/main" id="{F9B90511-7A45-47AF-BFE9-BB5884AFCBDE}"/>
+              </a:ext>
+            </a:extLst>
+          </p:cNvPr>
+          <p:cNvSpPr>
+            <a:spLocks noGrp="1"/>
+          </p:cNvSpPr>
+          <p:nvPr>
+            <p:ph type="sldNum" sz="quarter" idx="12"/>
+          </p:nvPr>
+        </p:nvSpPr>
+        <p:spPr/>
+        <p:txBody>
+          <a:bodyPr/>
+          <a:lstStyle/>
+          <a:p>
+            <a:fld id="{1CFD15D6-A40B-45EE-A88B-B645EAC7DF78}" type="slidenum">
+              <a:rPr lang="en-US" smtClean="0"/>
+              <a:pPr/>
+              <a:t>15</a:t>
+            </a:fld>
+            <a:endParaRPr lang="en-US" dirty="0"/>
+          </a:p>
+        </p:txBody>
+      </p:sp>
+      <p:sp>
+        <p:nvSpPr>
+          <p:cNvPr id="7" name="TextBox 6">
+            <a:extLst>
+              <a:ext uri="{FF2B5EF4-FFF2-40B4-BE49-F238E27FC236}">
+                <a16:creationId xmlns:a16="http://schemas.microsoft.com/office/drawing/2014/main" id="{424DEC97-7AA3-4231-9D59-DD5918D5DE9D}"/>
+              </a:ext>
+            </a:extLst>
+          </p:cNvPr>
+          <p:cNvSpPr txBox="1"/>
+          <p:nvPr/>
+        </p:nvSpPr>
+        <p:spPr>
+          <a:xfrm>
+            <a:off x="7631083" y="1706880"/>
+            <a:ext cx="3929150" cy="1754326"/>
+          </a:xfrm>
+          <a:prstGeom prst="rect">
+            <a:avLst/>
+          </a:prstGeom>
+          <a:noFill/>
+        </p:spPr>
+        <p:txBody>
+          <a:bodyPr wrap="square" rtlCol="0">
+            <a:spAutoFit/>
+          </a:bodyPr>
+          <a:lstStyle/>
+          <a:p>
+            <a:r>
+              <a:rPr lang="en-US" dirty="0"/>
+              <a:t>The “imaginary pulsar” method does not always do well – several outliers exist in this case</a:t>
+            </a:r>
+          </a:p>
+          <a:p>
+            <a:endParaRPr lang="en-US" dirty="0"/>
+          </a:p>
+          <a:p>
+            <a:r>
+              <a:rPr lang="en-US" dirty="0"/>
+              <a:t>Need more testing to figure out when this method fails</a:t>
+            </a:r>
+          </a:p>
+        </p:txBody>
+      </p:sp>
+      <p:sp>
+        <p:nvSpPr>
+          <p:cNvPr id="8" name="TextBox 7">
+            <a:extLst>
+              <a:ext uri="{FF2B5EF4-FFF2-40B4-BE49-F238E27FC236}">
+                <a16:creationId xmlns:a16="http://schemas.microsoft.com/office/drawing/2014/main" id="{4A874A2F-B077-4959-B283-56B71F2F312E}"/>
+              </a:ext>
+            </a:extLst>
+          </p:cNvPr>
+          <p:cNvSpPr txBox="1"/>
+          <p:nvPr/>
+        </p:nvSpPr>
+        <p:spPr>
+          <a:xfrm>
+            <a:off x="1492209" y="5971421"/>
+            <a:ext cx="5671902" cy="646331"/>
+          </a:xfrm>
+          <a:prstGeom prst="rect">
+            <a:avLst/>
+          </a:prstGeom>
+          <a:noFill/>
+        </p:spPr>
+        <p:txBody>
+          <a:bodyPr wrap="square" rtlCol="0">
+            <a:spAutoFit/>
+          </a:bodyPr>
+          <a:lstStyle/>
+          <a:p>
+            <a:r>
+              <a:rPr lang="en-US" dirty="0"/>
+              <a:t>410 km LEO, e = 0.03, f0 = 10 deg</a:t>
+            </a:r>
+          </a:p>
+          <a:p>
+            <a:r>
+              <a:rPr lang="en-US" dirty="0"/>
+              <a:t>dT = 90 mins (92%), noise = 0.5m/s, #obsv = 50, #sim = 70</a:t>
+            </a:r>
+          </a:p>
+        </p:txBody>
+      </p:sp>
+    </p:spTree>
+    <p:extLst>
+      <p:ext uri="{BB962C8B-B14F-4D97-AF65-F5344CB8AC3E}">
+        <p14:creationId xmlns:p14="http://schemas.microsoft.com/office/powerpoint/2010/main" val="3642999437"/>
+      </p:ext>
+    </p:extLst>
+  </p:cSld>
+  <p:clrMapOvr>
+    <a:masterClrMapping/>
+  </p:clrMapOvr>
+</p:sld>
+</file>
+
+<file path=ppt/slides/slide16.xml><?xml version="1.0" encoding="utf-8"?>
 <p:sld xmlns:a="http://schemas.openxmlformats.org/drawingml/2006/main" xmlns:r="http://schemas.openxmlformats.org/officeDocument/2006/relationships" xmlns:p="http://schemas.openxmlformats.org/presentationml/2006/main">
   <p:cSld>
     <p:spTree>
@@ -4984,31 +5757,99 @@
           <a:bodyPr/>
           <a:lstStyle/>
           <a:p>
+            <a:pPr>
+              <a:lnSpc>
+                <a:spcPct val="100000"/>
+              </a:lnSpc>
+            </a:pPr>
             <a:r>
               <a:rPr lang="en-US" dirty="0"/>
               <a:t>How to benchmark this method? Many variables</a:t>
             </a:r>
           </a:p>
           <a:p>
-            <a:pPr lvl="1"/>
+            <a:pPr lvl="1">
+              <a:lnSpc>
+                <a:spcPct val="100000"/>
+              </a:lnSpc>
+            </a:pPr>
             <a:r>
               <a:rPr lang="en-US" dirty="0"/>
               <a:t>All VIOD variables</a:t>
             </a:r>
           </a:p>
           <a:p>
-            <a:pPr lvl="1"/>
+            <a:pPr lvl="1">
+              <a:lnSpc>
+                <a:spcPct val="100000"/>
+              </a:lnSpc>
+            </a:pPr>
             <a:r>
               <a:rPr lang="en-US" dirty="0"/>
               <a:t>Number of pulsars</a:t>
             </a:r>
           </a:p>
           <a:p>
-            <a:pPr lvl="1"/>
+            <a:pPr lvl="1">
+              <a:lnSpc>
+                <a:spcPct val="100000"/>
+              </a:lnSpc>
+            </a:pPr>
             <a:r>
               <a:rPr lang="en-US" dirty="0"/>
               <a:t>Arrangement of measurements (timing, order)</a:t>
             </a:r>
+          </a:p>
+          <a:p>
+            <a:pPr>
+              <a:lnSpc>
+                <a:spcPct val="100000"/>
+              </a:lnSpc>
+            </a:pPr>
+            <a:r>
+              <a:rPr lang="en-US" dirty="0"/>
+              <a:t>Improving the noise model</a:t>
+            </a:r>
+          </a:p>
+          <a:p>
+            <a:pPr lvl="1">
+              <a:lnSpc>
+                <a:spcPct val="100000"/>
+              </a:lnSpc>
+            </a:pPr>
+            <a:r>
+              <a:rPr lang="en-US" dirty="0"/>
+              <a:t>Look for existing range-rate noise models</a:t>
+            </a:r>
+          </a:p>
+        </p:txBody>
+      </p:sp>
+      <p:sp>
+        <p:nvSpPr>
+          <p:cNvPr id="4" name="Slide Number Placeholder 3">
+            <a:extLst>
+              <a:ext uri="{FF2B5EF4-FFF2-40B4-BE49-F238E27FC236}">
+                <a16:creationId xmlns:a16="http://schemas.microsoft.com/office/drawing/2014/main" id="{86F38CA4-29E9-468C-BAB8-536612DB02A8}"/>
+              </a:ext>
+            </a:extLst>
+          </p:cNvPr>
+          <p:cNvSpPr>
+            <a:spLocks noGrp="1"/>
+          </p:cNvSpPr>
+          <p:nvPr>
+            <p:ph type="sldNum" sz="quarter" idx="12"/>
+          </p:nvPr>
+        </p:nvSpPr>
+        <p:spPr/>
+        <p:txBody>
+          <a:bodyPr/>
+          <a:lstStyle/>
+          <a:p>
+            <a:fld id="{1CFD15D6-A40B-45EE-A88B-B645EAC7DF78}" type="slidenum">
+              <a:rPr lang="en-US" smtClean="0"/>
+              <a:t>16</a:t>
+            </a:fld>
+            <a:endParaRPr lang="en-US"/>
           </a:p>
         </p:txBody>
       </p:sp>
@@ -5016,6 +5857,160 @@
     <p:extLst>
       <p:ext uri="{BB962C8B-B14F-4D97-AF65-F5344CB8AC3E}">
         <p14:creationId xmlns:p14="http://schemas.microsoft.com/office/powerpoint/2010/main" val="3638698881"/>
+      </p:ext>
+    </p:extLst>
+  </p:cSld>
+  <p:clrMapOvr>
+    <a:masterClrMapping/>
+  </p:clrMapOvr>
+</p:sld>
+</file>
+
+<file path=ppt/slides/slide17.xml><?xml version="1.0" encoding="utf-8"?>
+<p:sld xmlns:a="http://schemas.openxmlformats.org/drawingml/2006/main" xmlns:r="http://schemas.openxmlformats.org/officeDocument/2006/relationships" xmlns:p="http://schemas.openxmlformats.org/presentationml/2006/main">
+  <p:cSld>
+    <p:spTree>
+      <p:nvGrpSpPr>
+        <p:cNvPr id="1" name=""/>
+        <p:cNvGrpSpPr/>
+        <p:nvPr/>
+      </p:nvGrpSpPr>
+      <p:grpSpPr>
+        <a:xfrm>
+          <a:off x="0" y="0"/>
+          <a:ext cx="0" cy="0"/>
+          <a:chOff x="0" y="0"/>
+          <a:chExt cx="0" cy="0"/>
+        </a:xfrm>
+      </p:grpSpPr>
+      <p:sp>
+        <p:nvSpPr>
+          <p:cNvPr id="2" name="Title 1">
+            <a:extLst>
+              <a:ext uri="{FF2B5EF4-FFF2-40B4-BE49-F238E27FC236}">
+                <a16:creationId xmlns:a16="http://schemas.microsoft.com/office/drawing/2014/main" id="{5D798369-0545-40E0-8F9B-7A24F79C03FF}"/>
+              </a:ext>
+            </a:extLst>
+          </p:cNvPr>
+          <p:cNvSpPr>
+            <a:spLocks noGrp="1"/>
+          </p:cNvSpPr>
+          <p:nvPr>
+            <p:ph type="title"/>
+          </p:nvPr>
+        </p:nvSpPr>
+        <p:spPr/>
+        <p:txBody>
+          <a:bodyPr/>
+          <a:lstStyle/>
+          <a:p>
+            <a:r>
+              <a:rPr lang="en-US" dirty="0"/>
+              <a:t>Summary</a:t>
+            </a:r>
+          </a:p>
+        </p:txBody>
+      </p:sp>
+      <p:sp>
+        <p:nvSpPr>
+          <p:cNvPr id="3" name="Content Placeholder 2">
+            <a:extLst>
+              <a:ext uri="{FF2B5EF4-FFF2-40B4-BE49-F238E27FC236}">
+                <a16:creationId xmlns:a16="http://schemas.microsoft.com/office/drawing/2014/main" id="{4F8EB3DF-4BF0-4A78-878C-FF5BDA502FE5}"/>
+              </a:ext>
+            </a:extLst>
+          </p:cNvPr>
+          <p:cNvSpPr>
+            <a:spLocks noGrp="1"/>
+          </p:cNvSpPr>
+          <p:nvPr>
+            <p:ph idx="1"/>
+          </p:nvPr>
+        </p:nvSpPr>
+        <p:spPr/>
+        <p:txBody>
+          <a:bodyPr/>
+          <a:lstStyle/>
+          <a:p>
+            <a:pPr>
+              <a:lnSpc>
+                <a:spcPct val="100000"/>
+              </a:lnSpc>
+            </a:pPr>
+            <a:r>
+              <a:rPr lang="en-US" dirty="0"/>
+              <a:t>Developed relations between range-rate and the hodograph</a:t>
+            </a:r>
+          </a:p>
+          <a:p>
+            <a:pPr>
+              <a:lnSpc>
+                <a:spcPct val="100000"/>
+              </a:lnSpc>
+            </a:pPr>
+            <a:r>
+              <a:rPr lang="en-US" dirty="0"/>
+              <a:t>Developed objective function and algorithm to perform RROD</a:t>
+            </a:r>
+          </a:p>
+          <a:p>
+            <a:pPr>
+              <a:lnSpc>
+                <a:spcPct val="100000"/>
+              </a:lnSpc>
+            </a:pPr>
+            <a:r>
+              <a:rPr lang="en-US" dirty="0"/>
+              <a:t>Range-rate OD appears to be feasible</a:t>
+            </a:r>
+          </a:p>
+          <a:p>
+            <a:pPr>
+              <a:lnSpc>
+                <a:spcPct val="100000"/>
+              </a:lnSpc>
+            </a:pPr>
+            <a:r>
+              <a:rPr lang="en-US" dirty="0"/>
+              <a:t>Method seems capable of outperforming VIOD</a:t>
+            </a:r>
+          </a:p>
+        </p:txBody>
+      </p:sp>
+      <p:sp>
+        <p:nvSpPr>
+          <p:cNvPr id="4" name="Slide Number Placeholder 3">
+            <a:extLst>
+              <a:ext uri="{FF2B5EF4-FFF2-40B4-BE49-F238E27FC236}">
+                <a16:creationId xmlns:a16="http://schemas.microsoft.com/office/drawing/2014/main" id="{A143B4D1-950C-4B74-8D2A-293B81935003}"/>
+              </a:ext>
+            </a:extLst>
+          </p:cNvPr>
+          <p:cNvSpPr>
+            <a:spLocks noGrp="1"/>
+          </p:cNvSpPr>
+          <p:nvPr>
+            <p:ph type="sldNum" sz="quarter" idx="12"/>
+          </p:nvPr>
+        </p:nvSpPr>
+        <p:spPr/>
+        <p:txBody>
+          <a:bodyPr/>
+          <a:lstStyle/>
+          <a:p>
+            <a:fld id="{1CFD15D6-A40B-45EE-A88B-B645EAC7DF78}" type="slidenum">
+              <a:rPr lang="en-US" smtClean="0"/>
+              <a:pPr/>
+              <a:t>17</a:t>
+            </a:fld>
+            <a:endParaRPr lang="en-US" dirty="0"/>
+          </a:p>
+        </p:txBody>
+      </p:sp>
+    </p:spTree>
+    <p:extLst>
+      <p:ext uri="{BB962C8B-B14F-4D97-AF65-F5344CB8AC3E}">
+        <p14:creationId xmlns:p14="http://schemas.microsoft.com/office/powerpoint/2010/main" val="1169402990"/>
       </p:ext>
     </p:extLst>
   </p:cSld>
@@ -5100,7 +6095,7 @@
                 </a:pPr>
                 <a:r>
                   <a:rPr lang="en-US" dirty="0"/>
-                  <a:t>Know range-rate to &gt;= 3 pulsars at different times</a:t>
+                  <a:t>Know range-rate to &gt;= 3 pulsars at &gt;= 3 known times each</a:t>
                 </a:r>
               </a:p>
               <a:p>
@@ -5136,26 +6131,7 @@
                 </a:pPr>
                 <a:r>
                   <a:rPr lang="en-US" dirty="0"/>
-                  <a:t>Know pulsar coordinates</a:t>
-                </a:r>
-              </a:p>
-              <a:p>
-                <a:pPr>
-                  <a:lnSpc>
-                    <a:spcPct val="100000"/>
-                  </a:lnSpc>
-                </a:pPr>
-                <a:r>
-                  <a:rPr lang="en-US" dirty="0"/>
-                  <a:t>Know time of flight (</a:t>
-                </a:r>
-                <a:r>
-                  <a:rPr lang="en-US" dirty="0" err="1"/>
-                  <a:t>ToF</a:t>
-                </a:r>
-                <a:r>
-                  <a:rPr lang="en-US" dirty="0"/>
-                  <a:t>) between range-rate measurements</a:t>
+                  <a:t>Know pulsar coordinates in inertial frame (e.g., SSB)</a:t>
                 </a:r>
               </a:p>
             </p:txBody>
@@ -5201,6 +6177,35 @@
           </p:sp>
         </mc:Fallback>
       </mc:AlternateContent>
+      <p:sp>
+        <p:nvSpPr>
+          <p:cNvPr id="4" name="Slide Number Placeholder 3">
+            <a:extLst>
+              <a:ext uri="{FF2B5EF4-FFF2-40B4-BE49-F238E27FC236}">
+                <a16:creationId xmlns:a16="http://schemas.microsoft.com/office/drawing/2014/main" id="{0598CDB1-FD2F-4188-85A1-788FF749C5CD}"/>
+              </a:ext>
+            </a:extLst>
+          </p:cNvPr>
+          <p:cNvSpPr>
+            <a:spLocks noGrp="1"/>
+          </p:cNvSpPr>
+          <p:nvPr>
+            <p:ph type="sldNum" sz="quarter" idx="12"/>
+          </p:nvPr>
+        </p:nvSpPr>
+        <p:spPr/>
+        <p:txBody>
+          <a:bodyPr/>
+          <a:lstStyle/>
+          <a:p>
+            <a:fld id="{1CFD15D6-A40B-45EE-A88B-B645EAC7DF78}" type="slidenum">
+              <a:rPr lang="en-US" smtClean="0"/>
+              <a:t>2</a:t>
+            </a:fld>
+            <a:endParaRPr lang="en-US"/>
+          </a:p>
+        </p:txBody>
+      </p:sp>
     </p:spTree>
     <p:extLst>
       <p:ext uri="{BB962C8B-B14F-4D97-AF65-F5344CB8AC3E}">
@@ -5215,6 +6220,201 @@
 </file>
 
 <file path=ppt/slides/slide3.xml><?xml version="1.0" encoding="utf-8"?>
+<p:sld xmlns:a="http://schemas.openxmlformats.org/drawingml/2006/main" xmlns:r="http://schemas.openxmlformats.org/officeDocument/2006/relationships" xmlns:p="http://schemas.openxmlformats.org/presentationml/2006/main">
+  <p:cSld>
+    <p:spTree>
+      <p:nvGrpSpPr>
+        <p:cNvPr id="1" name=""/>
+        <p:cNvGrpSpPr/>
+        <p:nvPr/>
+      </p:nvGrpSpPr>
+      <p:grpSpPr>
+        <a:xfrm>
+          <a:off x="0" y="0"/>
+          <a:ext cx="0" cy="0"/>
+          <a:chOff x="0" y="0"/>
+          <a:chExt cx="0" cy="0"/>
+        </a:xfrm>
+      </p:grpSpPr>
+      <p:sp>
+        <p:nvSpPr>
+          <p:cNvPr id="2" name="Title 1">
+            <a:extLst>
+              <a:ext uri="{FF2B5EF4-FFF2-40B4-BE49-F238E27FC236}">
+                <a16:creationId xmlns:a16="http://schemas.microsoft.com/office/drawing/2014/main" id="{1F8A1CB7-B07F-406A-A916-48AADCB53728}"/>
+              </a:ext>
+            </a:extLst>
+          </p:cNvPr>
+          <p:cNvSpPr>
+            <a:spLocks noGrp="1"/>
+          </p:cNvSpPr>
+          <p:nvPr>
+            <p:ph type="title"/>
+          </p:nvPr>
+        </p:nvSpPr>
+        <p:spPr/>
+        <p:txBody>
+          <a:bodyPr/>
+          <a:lstStyle/>
+          <a:p>
+            <a:r>
+              <a:rPr lang="en-US" dirty="0"/>
+              <a:t>Hodograph Review</a:t>
+            </a:r>
+          </a:p>
+        </p:txBody>
+      </p:sp>
+      <p:pic>
+        <p:nvPicPr>
+          <p:cNvPr id="6" name="Content Placeholder 5" descr="Diagram&#10;&#10;Description automatically generated">
+            <a:extLst>
+              <a:ext uri="{FF2B5EF4-FFF2-40B4-BE49-F238E27FC236}">
+                <a16:creationId xmlns:a16="http://schemas.microsoft.com/office/drawing/2014/main" id="{084542B5-2026-4F4F-8CB3-F0A46A2AA88C}"/>
+              </a:ext>
+            </a:extLst>
+          </p:cNvPr>
+          <p:cNvPicPr>
+            <a:picLocks noGrp="1" noChangeAspect="1"/>
+          </p:cNvPicPr>
+          <p:nvPr>
+            <p:ph idx="1"/>
+          </p:nvPr>
+        </p:nvPicPr>
+        <p:blipFill>
+          <a:blip r:embed="rId2">
+            <a:extLst>
+              <a:ext uri="{28A0092B-C50C-407E-A947-70E740481C1C}">
+                <a14:useLocalDpi xmlns:a14="http://schemas.microsoft.com/office/drawing/2010/main" val="0"/>
+              </a:ext>
+            </a:extLst>
+          </a:blip>
+          <a:stretch>
+            <a:fillRect/>
+          </a:stretch>
+        </p:blipFill>
+        <p:spPr>
+          <a:xfrm>
+            <a:off x="1971865" y="1805721"/>
+            <a:ext cx="8248269" cy="3516416"/>
+          </a:xfrm>
+        </p:spPr>
+      </p:pic>
+      <p:sp>
+        <p:nvSpPr>
+          <p:cNvPr id="4" name="Slide Number Placeholder 3">
+            <a:extLst>
+              <a:ext uri="{FF2B5EF4-FFF2-40B4-BE49-F238E27FC236}">
+                <a16:creationId xmlns:a16="http://schemas.microsoft.com/office/drawing/2014/main" id="{E92CE52A-92FA-4F7C-AD08-C42656F48EF4}"/>
+              </a:ext>
+            </a:extLst>
+          </p:cNvPr>
+          <p:cNvSpPr>
+            <a:spLocks noGrp="1"/>
+          </p:cNvSpPr>
+          <p:nvPr>
+            <p:ph type="sldNum" sz="quarter" idx="12"/>
+          </p:nvPr>
+        </p:nvSpPr>
+        <p:spPr/>
+        <p:txBody>
+          <a:bodyPr/>
+          <a:lstStyle/>
+          <a:p>
+            <a:fld id="{1CFD15D6-A40B-45EE-A88B-B645EAC7DF78}" type="slidenum">
+              <a:rPr lang="en-US" smtClean="0"/>
+              <a:pPr/>
+              <a:t>3</a:t>
+            </a:fld>
+            <a:endParaRPr lang="en-US" dirty="0"/>
+          </a:p>
+        </p:txBody>
+      </p:sp>
+      <p:sp>
+        <p:nvSpPr>
+          <p:cNvPr id="7" name="TextBox 6">
+            <a:extLst>
+              <a:ext uri="{FF2B5EF4-FFF2-40B4-BE49-F238E27FC236}">
+                <a16:creationId xmlns:a16="http://schemas.microsoft.com/office/drawing/2014/main" id="{1ED9DA36-914F-499E-BF4E-69482221FFD9}"/>
+              </a:ext>
+            </a:extLst>
+          </p:cNvPr>
+          <p:cNvSpPr txBox="1"/>
+          <p:nvPr/>
+        </p:nvSpPr>
+        <p:spPr>
+          <a:xfrm>
+            <a:off x="8817298" y="4057307"/>
+            <a:ext cx="512867" cy="369332"/>
+          </a:xfrm>
+          <a:prstGeom prst="rect">
+            <a:avLst/>
+          </a:prstGeom>
+          <a:noFill/>
+        </p:spPr>
+        <p:txBody>
+          <a:bodyPr wrap="square" rtlCol="0">
+            <a:spAutoFit/>
+          </a:bodyPr>
+          <a:lstStyle/>
+          <a:p>
+            <a:pPr algn="ctr"/>
+            <a:r>
+              <a:rPr lang="en-US" dirty="0"/>
+              <a:t>x</a:t>
+            </a:r>
+          </a:p>
+        </p:txBody>
+      </p:sp>
+      <p:sp>
+        <p:nvSpPr>
+          <p:cNvPr id="8" name="TextBox 7">
+            <a:extLst>
+              <a:ext uri="{FF2B5EF4-FFF2-40B4-BE49-F238E27FC236}">
+                <a16:creationId xmlns:a16="http://schemas.microsoft.com/office/drawing/2014/main" id="{842619C9-F2BB-41AE-8AE4-5D4B533309B5}"/>
+              </a:ext>
+            </a:extLst>
+          </p:cNvPr>
+          <p:cNvSpPr txBox="1"/>
+          <p:nvPr/>
+        </p:nvSpPr>
+        <p:spPr>
+          <a:xfrm>
+            <a:off x="7507753" y="1613695"/>
+            <a:ext cx="512867" cy="369332"/>
+          </a:xfrm>
+          <a:prstGeom prst="rect">
+            <a:avLst/>
+          </a:prstGeom>
+          <a:noFill/>
+        </p:spPr>
+        <p:txBody>
+          <a:bodyPr wrap="square" rtlCol="0">
+            <a:spAutoFit/>
+          </a:bodyPr>
+          <a:lstStyle/>
+          <a:p>
+            <a:pPr algn="ctr"/>
+            <a:r>
+              <a:rPr lang="en-US" dirty="0"/>
+              <a:t>y</a:t>
+            </a:r>
+          </a:p>
+        </p:txBody>
+      </p:sp>
+    </p:spTree>
+    <p:extLst>
+      <p:ext uri="{BB962C8B-B14F-4D97-AF65-F5344CB8AC3E}">
+        <p14:creationId xmlns:p14="http://schemas.microsoft.com/office/powerpoint/2010/main" val="3585016660"/>
+      </p:ext>
+    </p:extLst>
+  </p:cSld>
+  <p:clrMapOvr>
+    <a:masterClrMapping/>
+  </p:clrMapOvr>
+</p:sld>
+</file>
+
+<file path=ppt/slides/slide4.xml><?xml version="1.0" encoding="utf-8"?>
 <p:sld xmlns:a="http://schemas.openxmlformats.org/drawingml/2006/main" xmlns:r="http://schemas.openxmlformats.org/officeDocument/2006/relationships" xmlns:p="http://schemas.openxmlformats.org/presentationml/2006/main">
   <p:cSld>
     <p:spTree>
@@ -5264,8 +6464,8 @@
           </a:p>
         </p:txBody>
       </p:sp>
-      <mc:AlternateContent xmlns:mc="http://schemas.openxmlformats.org/markup-compatibility/2006">
-        <mc:Choice xmlns:a14="http://schemas.microsoft.com/office/drawing/2010/main" Requires="a14">
+      <mc:AlternateContent xmlns:mc="http://schemas.openxmlformats.org/markup-compatibility/2006" xmlns:a14="http://schemas.microsoft.com/office/drawing/2010/main">
+        <mc:Choice Requires="a14">
           <p:sp>
             <p:nvSpPr>
               <p:cNvPr id="3" name="Content Placeholder 2">
@@ -5414,7 +6614,7 @@
             </p:txBody>
           </p:sp>
         </mc:Choice>
-        <mc:Fallback>
+        <mc:Fallback xmlns="">
           <p:sp>
             <p:nvSpPr>
               <p:cNvPr id="3" name="Content Placeholder 2">
@@ -5454,6 +6654,456 @@
           </p:sp>
         </mc:Fallback>
       </mc:AlternateContent>
+      <p:sp>
+        <p:nvSpPr>
+          <p:cNvPr id="4" name="Slide Number Placeholder 3">
+            <a:extLst>
+              <a:ext uri="{FF2B5EF4-FFF2-40B4-BE49-F238E27FC236}">
+                <a16:creationId xmlns:a16="http://schemas.microsoft.com/office/drawing/2014/main" id="{336BCC96-352D-49FA-96E6-8A3BAF190768}"/>
+              </a:ext>
+            </a:extLst>
+          </p:cNvPr>
+          <p:cNvSpPr>
+            <a:spLocks noGrp="1"/>
+          </p:cNvSpPr>
+          <p:nvPr>
+            <p:ph type="sldNum" sz="quarter" idx="12"/>
+          </p:nvPr>
+        </p:nvSpPr>
+        <p:spPr/>
+        <p:txBody>
+          <a:bodyPr/>
+          <a:lstStyle/>
+          <a:p>
+            <a:fld id="{1CFD15D6-A40B-45EE-A88B-B645EAC7DF78}" type="slidenum">
+              <a:rPr lang="en-US" smtClean="0"/>
+              <a:t>4</a:t>
+            </a:fld>
+            <a:endParaRPr lang="en-US"/>
+          </a:p>
+        </p:txBody>
+      </p:sp>
+      <mc:AlternateContent xmlns:mc="http://schemas.openxmlformats.org/markup-compatibility/2006">
+        <mc:Choice xmlns:a14="http://schemas.microsoft.com/office/drawing/2010/main" Requires="a14">
+          <p:sp>
+            <p:nvSpPr>
+              <p:cNvPr id="5" name="TextBox 4">
+                <a:extLst>
+                  <a:ext uri="{FF2B5EF4-FFF2-40B4-BE49-F238E27FC236}">
+                    <a16:creationId xmlns:a16="http://schemas.microsoft.com/office/drawing/2014/main" id="{E60B1C2F-719E-4522-A563-80C7EE993A99}"/>
+                  </a:ext>
+                </a:extLst>
+              </p:cNvPr>
+              <p:cNvSpPr txBox="1"/>
+              <p:nvPr/>
+            </p:nvSpPr>
+            <p:spPr>
+              <a:xfrm>
+                <a:off x="5776600" y="1460642"/>
+                <a:ext cx="3411205" cy="2803460"/>
+              </a:xfrm>
+              <a:prstGeom prst="rect">
+                <a:avLst/>
+              </a:prstGeom>
+              <a:noFill/>
+            </p:spPr>
+            <p:txBody>
+              <a:bodyPr wrap="square" rtlCol="0">
+                <a:spAutoFit/>
+              </a:bodyPr>
+              <a:lstStyle/>
+              <a:p>
+                <a14:m>
+                  <m:oMathPara xmlns:m="http://schemas.openxmlformats.org/officeDocument/2006/math">
+                    <m:oMathParaPr>
+                      <m:jc m:val="centerGroup"/>
+                    </m:oMathParaPr>
+                    <m:oMath xmlns:m="http://schemas.openxmlformats.org/officeDocument/2006/math">
+                      <m:r>
+                        <a:rPr lang="en-US" b="0" i="1" smtClean="0">
+                          <a:latin typeface="Cambria Math" panose="02040503050406030204" pitchFamily="18" charset="0"/>
+                        </a:rPr>
+                        <m:t>𝑇</m:t>
+                      </m:r>
+                      <m:r>
+                        <a:rPr lang="en-US" b="0" i="1" smtClean="0">
+                          <a:latin typeface="Cambria Math" panose="02040503050406030204" pitchFamily="18" charset="0"/>
+                        </a:rPr>
+                        <m:t>=</m:t>
+                      </m:r>
+                      <m:f>
+                        <m:fPr>
+                          <m:ctrlPr>
+                            <a:rPr lang="en-US" b="0" i="1" smtClean="0">
+                              <a:latin typeface="Cambria Math" panose="02040503050406030204" pitchFamily="18" charset="0"/>
+                            </a:rPr>
+                          </m:ctrlPr>
+                        </m:fPr>
+                        <m:num>
+                          <m:r>
+                            <a:rPr lang="en-US" b="0" i="1" smtClean="0">
+                              <a:latin typeface="Cambria Math" panose="02040503050406030204" pitchFamily="18" charset="0"/>
+                            </a:rPr>
+                            <m:t>2</m:t>
+                          </m:r>
+                          <m:r>
+                            <a:rPr lang="en-US" b="0" i="1" smtClean="0">
+                              <a:latin typeface="Cambria Math" panose="02040503050406030204" pitchFamily="18" charset="0"/>
+                            </a:rPr>
+                            <m:t>𝜋</m:t>
+                          </m:r>
+                        </m:num>
+                        <m:den>
+                          <m:r>
+                            <a:rPr lang="en-US" b="0" i="1" smtClean="0">
+                              <a:latin typeface="Cambria Math" panose="02040503050406030204" pitchFamily="18" charset="0"/>
+                            </a:rPr>
+                            <m:t>𝑑𝑀</m:t>
+                          </m:r>
+                        </m:den>
+                      </m:f>
+                      <m:r>
+                        <a:rPr lang="en-US" b="0" i="1" smtClean="0">
+                          <a:latin typeface="Cambria Math" panose="02040503050406030204" pitchFamily="18" charset="0"/>
+                        </a:rPr>
+                        <m:t>⋅(</m:t>
+                      </m:r>
+                      <m:sSub>
+                        <m:sSubPr>
+                          <m:ctrlPr>
+                            <a:rPr lang="en-US" b="0" i="1" smtClean="0">
+                              <a:latin typeface="Cambria Math" panose="02040503050406030204" pitchFamily="18" charset="0"/>
+                            </a:rPr>
+                          </m:ctrlPr>
+                        </m:sSubPr>
+                        <m:e>
+                          <m:r>
+                            <a:rPr lang="en-US" b="0" i="1" smtClean="0">
+                              <a:latin typeface="Cambria Math" panose="02040503050406030204" pitchFamily="18" charset="0"/>
+                            </a:rPr>
+                            <m:t>𝑡</m:t>
+                          </m:r>
+                        </m:e>
+                        <m:sub>
+                          <m:r>
+                            <a:rPr lang="en-US" b="0" i="1" smtClean="0">
+                              <a:latin typeface="Cambria Math" panose="02040503050406030204" pitchFamily="18" charset="0"/>
+                            </a:rPr>
+                            <m:t>𝑛</m:t>
+                          </m:r>
+                        </m:sub>
+                      </m:sSub>
+                      <m:r>
+                        <a:rPr lang="en-US" b="0" i="1" smtClean="0">
+                          <a:latin typeface="Cambria Math" panose="02040503050406030204" pitchFamily="18" charset="0"/>
+                        </a:rPr>
+                        <m:t>−</m:t>
+                      </m:r>
+                      <m:sSub>
+                        <m:sSubPr>
+                          <m:ctrlPr>
+                            <a:rPr lang="en-US" b="0" i="1" smtClean="0">
+                              <a:latin typeface="Cambria Math" panose="02040503050406030204" pitchFamily="18" charset="0"/>
+                            </a:rPr>
+                          </m:ctrlPr>
+                        </m:sSubPr>
+                        <m:e>
+                          <m:r>
+                            <a:rPr lang="en-US" b="0" i="1" smtClean="0">
+                              <a:latin typeface="Cambria Math" panose="02040503050406030204" pitchFamily="18" charset="0"/>
+                            </a:rPr>
+                            <m:t>𝑡</m:t>
+                          </m:r>
+                        </m:e>
+                        <m:sub>
+                          <m:r>
+                            <a:rPr lang="en-US" b="0" i="1" smtClean="0">
+                              <a:latin typeface="Cambria Math" panose="02040503050406030204" pitchFamily="18" charset="0"/>
+                            </a:rPr>
+                            <m:t>1</m:t>
+                          </m:r>
+                        </m:sub>
+                      </m:sSub>
+                      <m:r>
+                        <a:rPr lang="en-US" b="0" i="1" smtClean="0">
+                          <a:latin typeface="Cambria Math" panose="02040503050406030204" pitchFamily="18" charset="0"/>
+                        </a:rPr>
+                        <m:t>)</m:t>
+                      </m:r>
+                    </m:oMath>
+                  </m:oMathPara>
+                </a14:m>
+                <a:endParaRPr lang="en-US" dirty="0"/>
+              </a:p>
+              <a:p>
+                <a:endParaRPr lang="en-US" dirty="0"/>
+              </a:p>
+              <a:p>
+                <a14:m>
+                  <m:oMathPara xmlns:m="http://schemas.openxmlformats.org/officeDocument/2006/math">
+                    <m:oMathParaPr>
+                      <m:jc m:val="centerGroup"/>
+                    </m:oMathParaPr>
+                    <m:oMath xmlns:m="http://schemas.openxmlformats.org/officeDocument/2006/math">
+                      <m:r>
+                        <a:rPr lang="en-US" b="0" i="1" smtClean="0">
+                          <a:latin typeface="Cambria Math" panose="02040503050406030204" pitchFamily="18" charset="0"/>
+                        </a:rPr>
+                        <m:t>𝑎</m:t>
+                      </m:r>
+                      <m:r>
+                        <a:rPr lang="en-US" b="0" i="1" smtClean="0">
+                          <a:latin typeface="Cambria Math" panose="02040503050406030204" pitchFamily="18" charset="0"/>
+                        </a:rPr>
+                        <m:t>=</m:t>
+                      </m:r>
+                      <m:rad>
+                        <m:radPr>
+                          <m:ctrlPr>
+                            <a:rPr lang="en-US" b="0" i="1" smtClean="0">
+                              <a:latin typeface="Cambria Math" panose="02040503050406030204" pitchFamily="18" charset="0"/>
+                            </a:rPr>
+                          </m:ctrlPr>
+                        </m:radPr>
+                        <m:deg>
+                          <m:r>
+                            <a:rPr lang="en-US" b="0" i="1" smtClean="0">
+                              <a:latin typeface="Cambria Math" panose="02040503050406030204" pitchFamily="18" charset="0"/>
+                            </a:rPr>
+                            <m:t>3</m:t>
+                          </m:r>
+                        </m:deg>
+                        <m:e>
+                          <m:r>
+                            <a:rPr lang="en-US" i="1">
+                              <a:latin typeface="Cambria Math" panose="02040503050406030204" pitchFamily="18" charset="0"/>
+                            </a:rPr>
+                            <m:t>𝜇</m:t>
+                          </m:r>
+                          <m:r>
+                            <a:rPr lang="en-US" i="1">
+                              <a:latin typeface="Cambria Math" panose="02040503050406030204" pitchFamily="18" charset="0"/>
+                            </a:rPr>
+                            <m:t>⋅</m:t>
+                          </m:r>
+                          <m:sSup>
+                            <m:sSupPr>
+                              <m:ctrlPr>
+                                <a:rPr lang="en-US" i="1">
+                                  <a:latin typeface="Cambria Math" panose="02040503050406030204" pitchFamily="18" charset="0"/>
+                                </a:rPr>
+                              </m:ctrlPr>
+                            </m:sSupPr>
+                            <m:e>
+                              <m:d>
+                                <m:dPr>
+                                  <m:ctrlPr>
+                                    <a:rPr lang="en-US" i="1">
+                                      <a:latin typeface="Cambria Math" panose="02040503050406030204" pitchFamily="18" charset="0"/>
+                                    </a:rPr>
+                                  </m:ctrlPr>
+                                </m:dPr>
+                                <m:e>
+                                  <m:f>
+                                    <m:fPr>
+                                      <m:ctrlPr>
+                                        <a:rPr lang="en-US" i="1">
+                                          <a:latin typeface="Cambria Math" panose="02040503050406030204" pitchFamily="18" charset="0"/>
+                                        </a:rPr>
+                                      </m:ctrlPr>
+                                    </m:fPr>
+                                    <m:num>
+                                      <m:r>
+                                        <a:rPr lang="en-US" i="1">
+                                          <a:latin typeface="Cambria Math" panose="02040503050406030204" pitchFamily="18" charset="0"/>
+                                        </a:rPr>
+                                        <m:t>𝑇</m:t>
+                                      </m:r>
+                                    </m:num>
+                                    <m:den>
+                                      <m:r>
+                                        <a:rPr lang="en-US" i="1">
+                                          <a:latin typeface="Cambria Math" panose="02040503050406030204" pitchFamily="18" charset="0"/>
+                                        </a:rPr>
+                                        <m:t>2</m:t>
+                                      </m:r>
+                                      <m:r>
+                                        <a:rPr lang="en-US" i="1">
+                                          <a:latin typeface="Cambria Math" panose="02040503050406030204" pitchFamily="18" charset="0"/>
+                                        </a:rPr>
+                                        <m:t>𝜋</m:t>
+                                      </m:r>
+                                    </m:den>
+                                  </m:f>
+                                </m:e>
+                              </m:d>
+                            </m:e>
+                            <m:sup>
+                              <m:r>
+                                <a:rPr lang="en-US" i="1">
+                                  <a:latin typeface="Cambria Math" panose="02040503050406030204" pitchFamily="18" charset="0"/>
+                                </a:rPr>
+                                <m:t>2</m:t>
+                              </m:r>
+                            </m:sup>
+                          </m:sSup>
+                        </m:e>
+                      </m:rad>
+                    </m:oMath>
+                  </m:oMathPara>
+                </a14:m>
+                <a:endParaRPr lang="en-US" dirty="0"/>
+              </a:p>
+              <a:p>
+                <a:endParaRPr lang="en-US" dirty="0"/>
+              </a:p>
+              <a:p>
+                <a14:m>
+                  <m:oMathPara xmlns:m="http://schemas.openxmlformats.org/officeDocument/2006/math">
+                    <m:oMathParaPr>
+                      <m:jc m:val="centerGroup"/>
+                    </m:oMathParaPr>
+                    <m:oMath xmlns:m="http://schemas.openxmlformats.org/officeDocument/2006/math">
+                      <m:r>
+                        <a:rPr lang="en-US" b="0" i="1" smtClean="0">
+                          <a:latin typeface="Cambria Math" panose="02040503050406030204" pitchFamily="18" charset="0"/>
+                        </a:rPr>
+                        <m:t>𝑅</m:t>
+                      </m:r>
+                      <m:r>
+                        <a:rPr lang="en-US" b="0" i="1" smtClean="0">
+                          <a:latin typeface="Cambria Math" panose="02040503050406030204" pitchFamily="18" charset="0"/>
+                        </a:rPr>
+                        <m:t>=</m:t>
+                      </m:r>
+                      <m:rad>
+                        <m:radPr>
+                          <m:degHide m:val="on"/>
+                          <m:ctrlPr>
+                            <a:rPr lang="en-US" b="0" i="1" smtClean="0">
+                              <a:latin typeface="Cambria Math" panose="02040503050406030204" pitchFamily="18" charset="0"/>
+                            </a:rPr>
+                          </m:ctrlPr>
+                        </m:radPr>
+                        <m:deg/>
+                        <m:e>
+                          <m:f>
+                            <m:fPr>
+                              <m:ctrlPr>
+                                <a:rPr lang="en-US" b="0" i="1" smtClean="0">
+                                  <a:latin typeface="Cambria Math" panose="02040503050406030204" pitchFamily="18" charset="0"/>
+                                </a:rPr>
+                              </m:ctrlPr>
+                            </m:fPr>
+                            <m:num>
+                              <m:r>
+                                <a:rPr lang="en-US" b="0" i="1" smtClean="0">
+                                  <a:latin typeface="Cambria Math" panose="02040503050406030204" pitchFamily="18" charset="0"/>
+                                </a:rPr>
+                                <m:t>𝜇</m:t>
+                              </m:r>
+                            </m:num>
+                            <m:den>
+                              <m:r>
+                                <a:rPr lang="en-US" b="0" i="1" smtClean="0">
+                                  <a:latin typeface="Cambria Math" panose="02040503050406030204" pitchFamily="18" charset="0"/>
+                                </a:rPr>
+                                <m:t>𝑎</m:t>
+                              </m:r>
+                              <m:r>
+                                <a:rPr lang="en-US" b="0" i="1" smtClean="0">
+                                  <a:latin typeface="Cambria Math" panose="02040503050406030204" pitchFamily="18" charset="0"/>
+                                </a:rPr>
+                                <m:t>(1−</m:t>
+                              </m:r>
+                              <m:sSup>
+                                <m:sSupPr>
+                                  <m:ctrlPr>
+                                    <a:rPr lang="en-US" b="0" i="1" smtClean="0">
+                                      <a:latin typeface="Cambria Math" panose="02040503050406030204" pitchFamily="18" charset="0"/>
+                                    </a:rPr>
+                                  </m:ctrlPr>
+                                </m:sSupPr>
+                                <m:e>
+                                  <m:r>
+                                    <a:rPr lang="en-US" b="0" i="1" smtClean="0">
+                                      <a:latin typeface="Cambria Math" panose="02040503050406030204" pitchFamily="18" charset="0"/>
+                                    </a:rPr>
+                                    <m:t>𝑒</m:t>
+                                  </m:r>
+                                </m:e>
+                                <m:sup>
+                                  <m:r>
+                                    <a:rPr lang="en-US" b="0" i="1" smtClean="0">
+                                      <a:latin typeface="Cambria Math" panose="02040503050406030204" pitchFamily="18" charset="0"/>
+                                    </a:rPr>
+                                    <m:t>2</m:t>
+                                  </m:r>
+                                </m:sup>
+                              </m:sSup>
+                              <m:r>
+                                <a:rPr lang="en-US" b="0" i="1" smtClean="0">
+                                  <a:latin typeface="Cambria Math" panose="02040503050406030204" pitchFamily="18" charset="0"/>
+                                </a:rPr>
+                                <m:t>)</m:t>
+                              </m:r>
+                            </m:den>
+                          </m:f>
+                        </m:e>
+                      </m:rad>
+                    </m:oMath>
+                  </m:oMathPara>
+                </a14:m>
+                <a:endParaRPr lang="en-US" dirty="0"/>
+              </a:p>
+            </p:txBody>
+          </p:sp>
+        </mc:Choice>
+        <mc:Fallback>
+          <p:sp>
+            <p:nvSpPr>
+              <p:cNvPr id="5" name="TextBox 4">
+                <a:extLst>
+                  <a:ext uri="{FF2B5EF4-FFF2-40B4-BE49-F238E27FC236}">
+                    <a16:creationId xmlns:a16="http://schemas.microsoft.com/office/drawing/2014/main" id="{E60B1C2F-719E-4522-A563-80C7EE993A99}"/>
+                  </a:ext>
+                </a:extLst>
+              </p:cNvPr>
+              <p:cNvSpPr txBox="1">
+                <a:spLocks noRot="1" noChangeAspect="1" noMove="1" noResize="1" noEditPoints="1" noAdjustHandles="1" noChangeArrowheads="1" noChangeShapeType="1" noTextEdit="1"/>
+              </p:cNvSpPr>
+              <p:nvPr/>
+            </p:nvSpPr>
+            <p:spPr>
+              <a:xfrm>
+                <a:off x="5776600" y="1460642"/>
+                <a:ext cx="3411205" cy="2803460"/>
+              </a:xfrm>
+              <a:prstGeom prst="rect">
+                <a:avLst/>
+              </a:prstGeom>
+              <a:blipFill>
+                <a:blip r:embed="rId3"/>
+                <a:stretch>
+                  <a:fillRect/>
+                </a:stretch>
+              </a:blipFill>
+            </p:spPr>
+            <p:txBody>
+              <a:bodyPr/>
+              <a:lstStyle/>
+              <a:p>
+                <a:r>
+                  <a:rPr lang="en-US">
+                    <a:noFill/>
+                  </a:rPr>
+                  <a:t> </a:t>
+                </a:r>
+              </a:p>
+            </p:txBody>
+          </p:sp>
+        </mc:Fallback>
+      </mc:AlternateContent>
     </p:spTree>
     <p:extLst>
       <p:ext uri="{BB962C8B-B14F-4D97-AF65-F5344CB8AC3E}">
@@ -5467,7 +7117,7 @@
 </p:sld>
 </file>
 
-<file path=ppt/slides/slide4.xml><?xml version="1.0" encoding="utf-8"?>
+<file path=ppt/slides/slide5.xml><?xml version="1.0" encoding="utf-8"?>
 <p:sld xmlns:a="http://schemas.openxmlformats.org/drawingml/2006/main" xmlns:r="http://schemas.openxmlformats.org/officeDocument/2006/relationships" xmlns:p="http://schemas.openxmlformats.org/presentationml/2006/main">
   <p:cSld>
     <p:spTree>
@@ -5561,32 +7211,45 @@
                       </a:rPr>
                       <m:t>𝑅</m:t>
                     </m:r>
-                    <m:r>
-                      <m:rPr>
-                        <m:sty m:val="p"/>
-                      </m:rPr>
-                      <a:rPr lang="en-US" b="0" i="1" smtClean="0">
-                        <a:latin typeface="Cambria Math" panose="02040503050406030204" pitchFamily="18" charset="0"/>
-                      </a:rPr>
-                      <m:t>cos</m:t>
-                    </m:r>
-                    <m:d>
-                      <m:dPr>
+                    <m:func>
+                      <m:funcPr>
                         <m:ctrlPr>
-                          <a:rPr lang="en-US" b="0" i="1" smtClean="0">
+                          <a:rPr lang="en-US" i="1">
                             <a:latin typeface="Cambria Math" panose="02040503050406030204" pitchFamily="18" charset="0"/>
                           </a:rPr>
                         </m:ctrlPr>
-                      </m:dPr>
-                      <m:e>
+                      </m:funcPr>
+                      <m:fName>
                         <m:r>
-                          <a:rPr lang="en-US" b="0" i="1" smtClean="0">
+                          <m:rPr>
+                            <m:sty m:val="p"/>
+                          </m:rPr>
+                          <a:rPr lang="en-US">
                             <a:latin typeface="Cambria Math" panose="02040503050406030204" pitchFamily="18" charset="0"/>
                           </a:rPr>
-                          <m:t>𝛾</m:t>
+                          <m:t>sin</m:t>
                         </m:r>
+                      </m:fName>
+                      <m:e>
+                        <m:d>
+                          <m:dPr>
+                            <m:ctrlPr>
+                              <a:rPr lang="en-US" i="1">
+                                <a:latin typeface="Cambria Math" panose="02040503050406030204" pitchFamily="18" charset="0"/>
+                              </a:rPr>
+                            </m:ctrlPr>
+                          </m:dPr>
+                          <m:e>
+                            <m:r>
+                              <a:rPr lang="en-US" b="0" i="1" smtClean="0">
+                                <a:latin typeface="Cambria Math" panose="02040503050406030204" pitchFamily="18" charset="0"/>
+                              </a:rPr>
+                              <m:t>𝛾</m:t>
+                            </m:r>
+                          </m:e>
+                        </m:d>
                       </m:e>
-                    </m:d>
+                    </m:func>
                     <m:func>
                       <m:funcPr>
                         <m:ctrlPr>
@@ -5698,25 +7361,47 @@
                       <a:rPr lang="en-US" b="0" i="1" smtClean="0">
                         <a:latin typeface="Cambria Math" panose="02040503050406030204" pitchFamily="18" charset="0"/>
                       </a:rPr>
-                      <m:t>𝑅𝑐𝑜𝑠</m:t>
+                      <m:t>𝑅</m:t>
                     </m:r>
-                    <m:d>
-                      <m:dPr>
+                    <m:func>
+                      <m:funcPr>
                         <m:ctrlPr>
-                          <a:rPr lang="en-US" b="0" i="1" smtClean="0">
+                          <a:rPr lang="en-US" i="1">
                             <a:latin typeface="Cambria Math" panose="02040503050406030204" pitchFamily="18" charset="0"/>
                           </a:rPr>
                         </m:ctrlPr>
-                      </m:dPr>
-                      <m:e>
+                      </m:funcPr>
+                      <m:fName>
                         <m:r>
-                          <a:rPr lang="en-US" b="0" i="1" smtClean="0">
+                          <m:rPr>
+                            <m:sty m:val="p"/>
+                          </m:rPr>
+                          <a:rPr lang="en-US">
                             <a:latin typeface="Cambria Math" panose="02040503050406030204" pitchFamily="18" charset="0"/>
                           </a:rPr>
-                          <m:t>𝛾</m:t>
+                          <m:t>sin</m:t>
                         </m:r>
+                      </m:fName>
+                      <m:e>
+                        <m:d>
+                          <m:dPr>
+                            <m:ctrlPr>
+                              <a:rPr lang="en-US" i="1">
+                                <a:latin typeface="Cambria Math" panose="02040503050406030204" pitchFamily="18" charset="0"/>
+                              </a:rPr>
+                            </m:ctrlPr>
+                          </m:dPr>
+                          <m:e>
+                            <m:r>
+                              <a:rPr lang="en-US" b="0" i="1" smtClean="0">
+                                <a:latin typeface="Cambria Math" panose="02040503050406030204" pitchFamily="18" charset="0"/>
+                              </a:rPr>
+                              <m:t>𝛾</m:t>
+                            </m:r>
+                          </m:e>
+                        </m:d>
                       </m:e>
-                    </m:d>
+                    </m:func>
                     <m:func>
                       <m:funcPr>
                         <m:ctrlPr>
@@ -5839,28 +7524,7 @@
                 <a14:m>
                   <m:oMath xmlns:m="http://schemas.openxmlformats.org/officeDocument/2006/math">
                     <m:r>
-                      <a:rPr lang="en-US" i="1">
-                        <a:latin typeface="Cambria Math" panose="02040503050406030204" pitchFamily="18" charset="0"/>
-                      </a:rPr>
-                      <m:t>𝛾</m:t>
-                    </m:r>
-                  </m:oMath>
-                </a14:m>
-                <a:r>
-                  <a:rPr lang="en-US" dirty="0"/>
-                  <a:t> = pulsar inclination relative to orbit plane</a:t>
-                </a:r>
-              </a:p>
-              <a:p>
-                <a:pPr lvl="1">
-                  <a:lnSpc>
-                    <a:spcPct val="100000"/>
-                  </a:lnSpc>
-                </a:pPr>
-                <a14:m>
-                  <m:oMath xmlns:m="http://schemas.openxmlformats.org/officeDocument/2006/math">
-                    <m:r>
-                      <a:rPr lang="en-US" i="1">
+                      <a:rPr lang="en-US" i="1" smtClean="0">
                         <a:latin typeface="Cambria Math" panose="02040503050406030204" pitchFamily="18" charset="0"/>
                       </a:rPr>
                       <m:t>𝛼</m:t>
@@ -5869,21 +7533,7 @@
                 </a14:m>
                 <a:r>
                   <a:rPr lang="en-US" dirty="0"/>
-                  <a:t> = pulsar rotation about </a:t>
-                </a:r>
-                <a14:m>
-                  <m:oMath xmlns:m="http://schemas.openxmlformats.org/officeDocument/2006/math">
-                    <m:r>
-                      <a:rPr lang="en-US" i="1">
-                        <a:latin typeface="Cambria Math" panose="02040503050406030204" pitchFamily="18" charset="0"/>
-                      </a:rPr>
-                      <m:t>h</m:t>
-                    </m:r>
-                  </m:oMath>
-                </a14:m>
-                <a:r>
-                  <a:rPr lang="en-US" dirty="0"/>
-                  <a:t>, starting from </a:t>
+                  <a:t> = right ascension, referenced to </a:t>
                 </a:r>
                 <a14:m>
                   <m:oMath xmlns:m="http://schemas.openxmlformats.org/officeDocument/2006/math">
@@ -5914,7 +7564,30 @@
                     </m:sSub>
                   </m:oMath>
                 </a14:m>
-                <a:endParaRPr lang="en-US" dirty="0"/>
+                <a:endParaRPr lang="en-US" i="1" dirty="0">
+                  <a:latin typeface="Cambria Math" panose="02040503050406030204" pitchFamily="18" charset="0"/>
+                </a:endParaRPr>
+              </a:p>
+              <a:p>
+                <a:pPr lvl="1">
+                  <a:lnSpc>
+                    <a:spcPct val="100000"/>
+                  </a:lnSpc>
+                </a:pPr>
+                <a14:m>
+                  <m:oMath xmlns:m="http://schemas.openxmlformats.org/officeDocument/2006/math">
+                    <m:r>
+                      <a:rPr lang="en-US" i="1">
+                        <a:latin typeface="Cambria Math" panose="02040503050406030204" pitchFamily="18" charset="0"/>
+                      </a:rPr>
+                      <m:t>𝛾</m:t>
+                    </m:r>
+                  </m:oMath>
+                </a14:m>
+                <a:r>
+                  <a:rPr lang="en-US" dirty="0"/>
+                  <a:t> = declination</a:t>
+                </a:r>
               </a:p>
               <a:p>
                 <a:pPr>
@@ -6882,8 +8555,8 @@
           </a:p>
         </p:txBody>
       </p:sp>
-      <mc:AlternateContent xmlns:mc="http://schemas.openxmlformats.org/markup-compatibility/2006">
-        <mc:Choice xmlns:a14="http://schemas.microsoft.com/office/drawing/2010/main" Requires="a14">
+      <mc:AlternateContent xmlns:mc="http://schemas.openxmlformats.org/markup-compatibility/2006" xmlns:a14="http://schemas.microsoft.com/office/drawing/2010/main">
+        <mc:Choice Requires="a14">
           <p:sp>
             <p:nvSpPr>
               <p:cNvPr id="7" name="TextBox 6">
@@ -6912,6 +8585,7 @@
               </a:bodyPr>
               <a:lstStyle/>
               <a:p>
+                <a:pPr/>
                 <a14:m>
                   <m:oMathPara xmlns:m="http://schemas.openxmlformats.org/officeDocument/2006/math">
                     <m:oMathParaPr>
@@ -6932,7 +8606,7 @@
             </p:txBody>
           </p:sp>
         </mc:Choice>
-        <mc:Fallback>
+        <mc:Fallback xmlns="">
           <p:sp>
             <p:nvSpPr>
               <p:cNvPr id="7" name="TextBox 6">
@@ -6977,8 +8651,8 @@
           </p:sp>
         </mc:Fallback>
       </mc:AlternateContent>
-      <mc:AlternateContent xmlns:mc="http://schemas.openxmlformats.org/markup-compatibility/2006">
-        <mc:Choice xmlns:a14="http://schemas.microsoft.com/office/drawing/2010/main" Requires="a14">
+      <mc:AlternateContent xmlns:mc="http://schemas.openxmlformats.org/markup-compatibility/2006" xmlns:a14="http://schemas.microsoft.com/office/drawing/2010/main">
+        <mc:Choice Requires="a14">
           <p:sp>
             <p:nvSpPr>
               <p:cNvPr id="8" name="TextBox 7">
@@ -7007,6 +8681,7 @@
               </a:bodyPr>
               <a:lstStyle/>
               <a:p>
+                <a:pPr/>
                 <a14:m>
                   <m:oMathPara xmlns:m="http://schemas.openxmlformats.org/officeDocument/2006/math">
                     <m:oMathParaPr>
@@ -7027,7 +8702,7 @@
             </p:txBody>
           </p:sp>
         </mc:Choice>
-        <mc:Fallback>
+        <mc:Fallback xmlns="">
           <p:sp>
             <p:nvSpPr>
               <p:cNvPr id="8" name="TextBox 7">
@@ -7072,8 +8747,8 @@
           </p:sp>
         </mc:Fallback>
       </mc:AlternateContent>
-      <mc:AlternateContent xmlns:mc="http://schemas.openxmlformats.org/markup-compatibility/2006">
-        <mc:Choice xmlns:a14="http://schemas.microsoft.com/office/drawing/2010/main" Requires="a14">
+      <mc:AlternateContent xmlns:mc="http://schemas.openxmlformats.org/markup-compatibility/2006" xmlns:a14="http://schemas.microsoft.com/office/drawing/2010/main">
+        <mc:Choice Requires="a14">
           <p:sp>
             <p:nvSpPr>
               <p:cNvPr id="9" name="TextBox 8">
@@ -7102,6 +8777,7 @@
               </a:bodyPr>
               <a:lstStyle/>
               <a:p>
+                <a:pPr/>
                 <a14:m>
                   <m:oMathPara xmlns:m="http://schemas.openxmlformats.org/officeDocument/2006/math">
                     <m:oMathParaPr>
@@ -7122,7 +8798,7 @@
             </p:txBody>
           </p:sp>
         </mc:Choice>
-        <mc:Fallback>
+        <mc:Fallback xmlns="">
           <p:sp>
             <p:nvSpPr>
               <p:cNvPr id="9" name="TextBox 8">
@@ -7167,6 +8843,35 @@
           </p:sp>
         </mc:Fallback>
       </mc:AlternateContent>
+      <p:sp>
+        <p:nvSpPr>
+          <p:cNvPr id="10" name="Slide Number Placeholder 9">
+            <a:extLst>
+              <a:ext uri="{FF2B5EF4-FFF2-40B4-BE49-F238E27FC236}">
+                <a16:creationId xmlns:a16="http://schemas.microsoft.com/office/drawing/2014/main" id="{20B4AA27-E565-417C-9CDA-49BC7A726955}"/>
+              </a:ext>
+            </a:extLst>
+          </p:cNvPr>
+          <p:cNvSpPr>
+            <a:spLocks noGrp="1"/>
+          </p:cNvSpPr>
+          <p:nvPr>
+            <p:ph type="sldNum" sz="quarter" idx="12"/>
+          </p:nvPr>
+        </p:nvSpPr>
+        <p:spPr/>
+        <p:txBody>
+          <a:bodyPr/>
+          <a:lstStyle/>
+          <a:p>
+            <a:fld id="{1CFD15D6-A40B-45EE-A88B-B645EAC7DF78}" type="slidenum">
+              <a:rPr lang="en-US" smtClean="0"/>
+              <a:t>5</a:t>
+            </a:fld>
+            <a:endParaRPr lang="en-US"/>
+          </a:p>
+        </p:txBody>
+      </p:sp>
     </p:spTree>
     <p:extLst>
       <p:ext uri="{BB962C8B-B14F-4D97-AF65-F5344CB8AC3E}">
@@ -7180,7 +8885,7 @@
 </p:sld>
 </file>
 
-<file path=ppt/slides/slide5.xml><?xml version="1.0" encoding="utf-8"?>
+<file path=ppt/slides/slide6.xml><?xml version="1.0" encoding="utf-8"?>
 <p:sld xmlns:a="http://schemas.openxmlformats.org/drawingml/2006/main" xmlns:r="http://schemas.openxmlformats.org/officeDocument/2006/relationships" xmlns:p="http://schemas.openxmlformats.org/presentationml/2006/main">
   <p:cSld>
     <p:spTree>
@@ -7225,8 +8930,8 @@
           </a:p>
         </p:txBody>
       </p:sp>
-      <mc:AlternateContent xmlns:mc="http://schemas.openxmlformats.org/markup-compatibility/2006">
-        <mc:Choice xmlns:a14="http://schemas.microsoft.com/office/drawing/2010/main" Requires="a14">
+      <mc:AlternateContent xmlns:mc="http://schemas.openxmlformats.org/markup-compatibility/2006" xmlns:a14="http://schemas.microsoft.com/office/drawing/2010/main">
+        <mc:Choice Requires="a14">
           <p:sp>
             <p:nvSpPr>
               <p:cNvPr id="3" name="Content Placeholder 2">
@@ -7677,13 +9382,7 @@
                                   <a:rPr lang="en-US" b="0" i="1" smtClean="0">
                                     <a:latin typeface="Cambria Math" panose="02040503050406030204" pitchFamily="18" charset="0"/>
                                   </a:rPr>
-                                  <m:t>)</m:t>
-                                </m:r>
-                                <m:r>
-                                  <a:rPr lang="en-US" b="0" i="1" smtClean="0">
-                                    <a:latin typeface="Cambria Math" panose="02040503050406030204" pitchFamily="18" charset="0"/>
-                                  </a:rPr>
-                                  <m:t>−</m:t>
+                                  <m:t>)−</m:t>
                                 </m:r>
                                 <m:r>
                                   <a:rPr lang="en-US" i="1">
@@ -7774,7 +9473,7 @@
             </p:txBody>
           </p:sp>
         </mc:Choice>
-        <mc:Fallback>
+        <mc:Fallback xmlns="">
           <p:sp>
             <p:nvSpPr>
               <p:cNvPr id="3" name="Content Placeholder 2">
@@ -8100,8 +9799,8 @@
           </a:p>
         </p:txBody>
       </p:sp>
-      <mc:AlternateContent xmlns:mc="http://schemas.openxmlformats.org/markup-compatibility/2006">
-        <mc:Choice xmlns:a14="http://schemas.microsoft.com/office/drawing/2010/main" Requires="a14">
+      <mc:AlternateContent xmlns:mc="http://schemas.openxmlformats.org/markup-compatibility/2006" xmlns:a14="http://schemas.microsoft.com/office/drawing/2010/main">
+        <mc:Choice Requires="a14">
           <p:sp>
             <p:nvSpPr>
               <p:cNvPr id="18" name="TextBox 17">
@@ -8130,6 +9829,7 @@
               </a:bodyPr>
               <a:lstStyle/>
               <a:p>
+                <a:pPr/>
                 <a14:m>
                   <m:oMathPara xmlns:m="http://schemas.openxmlformats.org/officeDocument/2006/math">
                     <m:oMathParaPr>
@@ -8181,7 +9881,7 @@
             </p:txBody>
           </p:sp>
         </mc:Choice>
-        <mc:Fallback>
+        <mc:Fallback xmlns="">
           <p:sp>
             <p:nvSpPr>
               <p:cNvPr id="18" name="TextBox 17">
@@ -8226,8 +9926,8 @@
           </p:sp>
         </mc:Fallback>
       </mc:AlternateContent>
-      <mc:AlternateContent xmlns:mc="http://schemas.openxmlformats.org/markup-compatibility/2006">
-        <mc:Choice xmlns:a14="http://schemas.microsoft.com/office/drawing/2010/main" Requires="a14">
+      <mc:AlternateContent xmlns:mc="http://schemas.openxmlformats.org/markup-compatibility/2006" xmlns:a14="http://schemas.microsoft.com/office/drawing/2010/main">
+        <mc:Choice Requires="a14">
           <p:sp>
             <p:nvSpPr>
               <p:cNvPr id="19" name="TextBox 18">
@@ -8256,6 +9956,7 @@
               </a:bodyPr>
               <a:lstStyle/>
               <a:p>
+                <a:pPr/>
                 <a14:m>
                   <m:oMathPara xmlns:m="http://schemas.openxmlformats.org/officeDocument/2006/math">
                     <m:oMathParaPr>
@@ -8307,7 +10008,7 @@
             </p:txBody>
           </p:sp>
         </mc:Choice>
-        <mc:Fallback>
+        <mc:Fallback xmlns="">
           <p:sp>
             <p:nvSpPr>
               <p:cNvPr id="19" name="TextBox 18">
@@ -8352,8 +10053,8 @@
           </p:sp>
         </mc:Fallback>
       </mc:AlternateContent>
-      <mc:AlternateContent xmlns:mc="http://schemas.openxmlformats.org/markup-compatibility/2006">
-        <mc:Choice xmlns:a14="http://schemas.microsoft.com/office/drawing/2010/main" Requires="a14">
+      <mc:AlternateContent xmlns:mc="http://schemas.openxmlformats.org/markup-compatibility/2006" xmlns:a14="http://schemas.microsoft.com/office/drawing/2010/main">
+        <mc:Choice Requires="a14">
           <p:sp>
             <p:nvSpPr>
               <p:cNvPr id="20" name="TextBox 19">
@@ -8382,6 +10083,7 @@
               </a:bodyPr>
               <a:lstStyle/>
               <a:p>
+                <a:pPr/>
                 <a14:m>
                   <m:oMathPara xmlns:m="http://schemas.openxmlformats.org/officeDocument/2006/math">
                     <m:oMathParaPr>
@@ -8421,7 +10123,7 @@
             </p:txBody>
           </p:sp>
         </mc:Choice>
-        <mc:Fallback>
+        <mc:Fallback xmlns="">
           <p:sp>
             <p:nvSpPr>
               <p:cNvPr id="20" name="TextBox 19">
@@ -8466,8 +10168,8 @@
           </p:sp>
         </mc:Fallback>
       </mc:AlternateContent>
-      <mc:AlternateContent xmlns:mc="http://schemas.openxmlformats.org/markup-compatibility/2006">
-        <mc:Choice xmlns:a14="http://schemas.microsoft.com/office/drawing/2010/main" Requires="a14">
+      <mc:AlternateContent xmlns:mc="http://schemas.openxmlformats.org/markup-compatibility/2006" xmlns:a14="http://schemas.microsoft.com/office/drawing/2010/main">
+        <mc:Choice Requires="a14">
           <p:sp>
             <p:nvSpPr>
               <p:cNvPr id="21" name="TextBox 20">
@@ -8496,6 +10198,7 @@
               </a:bodyPr>
               <a:lstStyle/>
               <a:p>
+                <a:pPr/>
                 <a14:m>
                   <m:oMathPara xmlns:m="http://schemas.openxmlformats.org/officeDocument/2006/math">
                     <m:oMathParaPr>
@@ -8535,7 +10238,7 @@
             </p:txBody>
           </p:sp>
         </mc:Choice>
-        <mc:Fallback>
+        <mc:Fallback xmlns="">
           <p:sp>
             <p:nvSpPr>
               <p:cNvPr id="21" name="TextBox 20">
@@ -8580,6 +10283,35 @@
           </p:sp>
         </mc:Fallback>
       </mc:AlternateContent>
+      <p:sp>
+        <p:nvSpPr>
+          <p:cNvPr id="4" name="Slide Number Placeholder 3">
+            <a:extLst>
+              <a:ext uri="{FF2B5EF4-FFF2-40B4-BE49-F238E27FC236}">
+                <a16:creationId xmlns:a16="http://schemas.microsoft.com/office/drawing/2014/main" id="{D34A9AEC-630E-41F2-BCC7-7367150F6E69}"/>
+              </a:ext>
+            </a:extLst>
+          </p:cNvPr>
+          <p:cNvSpPr>
+            <a:spLocks noGrp="1"/>
+          </p:cNvSpPr>
+          <p:nvPr>
+            <p:ph type="sldNum" sz="quarter" idx="12"/>
+          </p:nvPr>
+        </p:nvSpPr>
+        <p:spPr/>
+        <p:txBody>
+          <a:bodyPr/>
+          <a:lstStyle/>
+          <a:p>
+            <a:fld id="{1CFD15D6-A40B-45EE-A88B-B645EAC7DF78}" type="slidenum">
+              <a:rPr lang="en-US" smtClean="0"/>
+              <a:t>6</a:t>
+            </a:fld>
+            <a:endParaRPr lang="en-US"/>
+          </a:p>
+        </p:txBody>
+      </p:sp>
     </p:spTree>
     <p:extLst>
       <p:ext uri="{BB962C8B-B14F-4D97-AF65-F5344CB8AC3E}">
@@ -8593,7 +10325,7 @@
 </p:sld>
 </file>
 
-<file path=ppt/slides/slide6.xml><?xml version="1.0" encoding="utf-8"?>
+<file path=ppt/slides/slide7.xml><?xml version="1.0" encoding="utf-8"?>
 <p:sld xmlns:a="http://schemas.openxmlformats.org/drawingml/2006/main" xmlns:r="http://schemas.openxmlformats.org/officeDocument/2006/relationships" xmlns:p="http://schemas.openxmlformats.org/presentationml/2006/main">
   <p:cSld>
     <p:spTree>
@@ -8638,8 +10370,8 @@
           </a:p>
         </p:txBody>
       </p:sp>
-      <mc:AlternateContent xmlns:mc="http://schemas.openxmlformats.org/markup-compatibility/2006">
-        <mc:Choice xmlns:a14="http://schemas.microsoft.com/office/drawing/2010/main" Requires="a14">
+      <mc:AlternateContent xmlns:mc="http://schemas.openxmlformats.org/markup-compatibility/2006" xmlns:a14="http://schemas.microsoft.com/office/drawing/2010/main">
+        <mc:Choice Requires="a14">
           <p:sp>
             <p:nvSpPr>
               <p:cNvPr id="3" name="Content Placeholder 2">
@@ -9026,7 +10758,7 @@
             </p:txBody>
           </p:sp>
         </mc:Choice>
-        <mc:Fallback>
+        <mc:Fallback xmlns="">
           <p:sp>
             <p:nvSpPr>
               <p:cNvPr id="3" name="Content Placeholder 2">
@@ -9158,8 +10890,8 @@
           </a:fontRef>
         </p:style>
       </p:cxnSp>
-      <mc:AlternateContent xmlns:mc="http://schemas.openxmlformats.org/markup-compatibility/2006">
-        <mc:Choice xmlns:a14="http://schemas.microsoft.com/office/drawing/2010/main" Requires="a14">
+      <mc:AlternateContent xmlns:mc="http://schemas.openxmlformats.org/markup-compatibility/2006" xmlns:a14="http://schemas.microsoft.com/office/drawing/2010/main">
+        <mc:Choice Requires="a14">
           <p:sp>
             <p:nvSpPr>
               <p:cNvPr id="6" name="TextBox 5">
@@ -9188,6 +10920,7 @@
               </a:bodyPr>
               <a:lstStyle/>
               <a:p>
+                <a:pPr/>
                 <a14:m>
                   <m:oMathPara xmlns:m="http://schemas.openxmlformats.org/officeDocument/2006/math">
                     <m:oMathParaPr>
@@ -9239,7 +10972,7 @@
             </p:txBody>
           </p:sp>
         </mc:Choice>
-        <mc:Fallback>
+        <mc:Fallback xmlns="">
           <p:sp>
             <p:nvSpPr>
               <p:cNvPr id="6" name="TextBox 5">
@@ -9284,8 +11017,8 @@
           </p:sp>
         </mc:Fallback>
       </mc:AlternateContent>
-      <mc:AlternateContent xmlns:mc="http://schemas.openxmlformats.org/markup-compatibility/2006">
-        <mc:Choice xmlns:a14="http://schemas.microsoft.com/office/drawing/2010/main" Requires="a14">
+      <mc:AlternateContent xmlns:mc="http://schemas.openxmlformats.org/markup-compatibility/2006" xmlns:a14="http://schemas.microsoft.com/office/drawing/2010/main">
+        <mc:Choice Requires="a14">
           <p:sp>
             <p:nvSpPr>
               <p:cNvPr id="7" name="TextBox 6">
@@ -9314,6 +11047,7 @@
               </a:bodyPr>
               <a:lstStyle/>
               <a:p>
+                <a:pPr/>
                 <a14:m>
                   <m:oMathPara xmlns:m="http://schemas.openxmlformats.org/officeDocument/2006/math">
                     <m:oMathParaPr>
@@ -9365,7 +11099,7 @@
             </p:txBody>
           </p:sp>
         </mc:Choice>
-        <mc:Fallback>
+        <mc:Fallback xmlns="">
           <p:sp>
             <p:nvSpPr>
               <p:cNvPr id="7" name="TextBox 6">
@@ -9519,8 +11253,8 @@
           </p:style>
         </p:cxnSp>
       </p:grpSp>
-      <mc:AlternateContent xmlns:mc="http://schemas.openxmlformats.org/markup-compatibility/2006">
-        <mc:Choice xmlns:a14="http://schemas.microsoft.com/office/drawing/2010/main" Requires="a14">
+      <mc:AlternateContent xmlns:mc="http://schemas.openxmlformats.org/markup-compatibility/2006" xmlns:a14="http://schemas.microsoft.com/office/drawing/2010/main">
+        <mc:Choice Requires="a14">
           <p:sp>
             <p:nvSpPr>
               <p:cNvPr id="16" name="TextBox 15">
@@ -9549,6 +11283,7 @@
               </a:bodyPr>
               <a:lstStyle/>
               <a:p>
+                <a:pPr/>
                 <a14:m>
                   <m:oMathPara xmlns:m="http://schemas.openxmlformats.org/officeDocument/2006/math">
                     <m:oMathParaPr>
@@ -9588,7 +11323,7 @@
             </p:txBody>
           </p:sp>
         </mc:Choice>
-        <mc:Fallback>
+        <mc:Fallback xmlns="">
           <p:sp>
             <p:nvSpPr>
               <p:cNvPr id="16" name="TextBox 15">
@@ -9633,8 +11368,8 @@
           </p:sp>
         </mc:Fallback>
       </mc:AlternateContent>
-      <mc:AlternateContent xmlns:mc="http://schemas.openxmlformats.org/markup-compatibility/2006">
-        <mc:Choice xmlns:a14="http://schemas.microsoft.com/office/drawing/2010/main" Requires="a14">
+      <mc:AlternateContent xmlns:mc="http://schemas.openxmlformats.org/markup-compatibility/2006" xmlns:a14="http://schemas.microsoft.com/office/drawing/2010/main">
+        <mc:Choice Requires="a14">
           <p:sp>
             <p:nvSpPr>
               <p:cNvPr id="17" name="TextBox 16">
@@ -9663,6 +11398,7 @@
               </a:bodyPr>
               <a:lstStyle/>
               <a:p>
+                <a:pPr/>
                 <a14:m>
                   <m:oMathPara xmlns:m="http://schemas.openxmlformats.org/officeDocument/2006/math">
                     <m:oMathParaPr>
@@ -9702,7 +11438,7 @@
             </p:txBody>
           </p:sp>
         </mc:Choice>
-        <mc:Fallback>
+        <mc:Fallback xmlns="">
           <p:sp>
             <p:nvSpPr>
               <p:cNvPr id="17" name="TextBox 16">
@@ -9851,6 +11587,35 @@
           </a:p>
         </p:txBody>
       </p:sp>
+      <p:sp>
+        <p:nvSpPr>
+          <p:cNvPr id="8" name="Slide Number Placeholder 7">
+            <a:extLst>
+              <a:ext uri="{FF2B5EF4-FFF2-40B4-BE49-F238E27FC236}">
+                <a16:creationId xmlns:a16="http://schemas.microsoft.com/office/drawing/2014/main" id="{9AED8C9A-1A2E-43B3-8C8F-467AD3AC1D4D}"/>
+              </a:ext>
+            </a:extLst>
+          </p:cNvPr>
+          <p:cNvSpPr>
+            <a:spLocks noGrp="1"/>
+          </p:cNvSpPr>
+          <p:nvPr>
+            <p:ph type="sldNum" sz="quarter" idx="12"/>
+          </p:nvPr>
+        </p:nvSpPr>
+        <p:spPr/>
+        <p:txBody>
+          <a:bodyPr/>
+          <a:lstStyle/>
+          <a:p>
+            <a:fld id="{1CFD15D6-A40B-45EE-A88B-B645EAC7DF78}" type="slidenum">
+              <a:rPr lang="en-US" smtClean="0"/>
+              <a:t>7</a:t>
+            </a:fld>
+            <a:endParaRPr lang="en-US"/>
+          </a:p>
+        </p:txBody>
+      </p:sp>
     </p:spTree>
     <p:extLst>
       <p:ext uri="{BB962C8B-B14F-4D97-AF65-F5344CB8AC3E}">
@@ -9864,7 +11629,7 @@
 </p:sld>
 </file>
 
-<file path=ppt/slides/slide7.xml><?xml version="1.0" encoding="utf-8"?>
+<file path=ppt/slides/slide8.xml><?xml version="1.0" encoding="utf-8"?>
 <p:sld xmlns:a="http://schemas.openxmlformats.org/drawingml/2006/main" xmlns:r="http://schemas.openxmlformats.org/officeDocument/2006/relationships" xmlns:p="http://schemas.openxmlformats.org/presentationml/2006/main">
   <p:cSld>
     <p:spTree>
@@ -9931,6 +11696,38 @@
             <p:txBody>
               <a:bodyPr/>
               <a:lstStyle/>
+              <a:p>
+                <a:pPr marL="0" indent="0">
+                  <a:buNone/>
+                </a:pPr>
+                <a:endParaRPr lang="en-US" sz="2000" b="0" i="1" dirty="0">
+                  <a:latin typeface="Cambria Math" panose="02040503050406030204" pitchFamily="18" charset="0"/>
+                </a:endParaRPr>
+              </a:p>
+              <a:p>
+                <a:pPr marL="0" indent="0">
+                  <a:buNone/>
+                </a:pPr>
+                <a:endParaRPr lang="en-US" sz="2000" i="1" dirty="0">
+                  <a:latin typeface="Cambria Math" panose="02040503050406030204" pitchFamily="18" charset="0"/>
+                </a:endParaRPr>
+              </a:p>
+              <a:p>
+                <a:pPr marL="0" indent="0">
+                  <a:buNone/>
+                </a:pPr>
+                <a:endParaRPr lang="en-US" sz="2000" b="0" i="1" dirty="0">
+                  <a:latin typeface="Cambria Math" panose="02040503050406030204" pitchFamily="18" charset="0"/>
+                </a:endParaRPr>
+              </a:p>
+              <a:p>
+                <a:pPr marL="0" indent="0">
+                  <a:buNone/>
+                </a:pPr>
+                <a:endParaRPr lang="en-US" sz="2000" i="1" dirty="0">
+                  <a:latin typeface="Cambria Math" panose="02040503050406030204" pitchFamily="18" charset="0"/>
+                </a:endParaRPr>
+              </a:p>
               <a:p>
                 <a:pPr marL="0" indent="0">
                   <a:buNone/>
@@ -10386,13 +12183,7 @@
                                     <a:rPr lang="en-US" sz="2000" i="1">
                                       <a:latin typeface="Cambria Math" panose="02040503050406030204" pitchFamily="18" charset="0"/>
                                     </a:rPr>
-                                    <m:t>)−</m:t>
-                                  </m:r>
-                                  <m:r>
-                                    <a:rPr lang="en-US" sz="2000" i="1">
-                                      <a:latin typeface="Cambria Math" panose="02040503050406030204" pitchFamily="18" charset="0"/>
-                                    </a:rPr>
-                                    <m:t>(</m:t>
+                                    <m:t>)−(</m:t>
                                   </m:r>
                                   <m:sSub>
                                     <m:sSubPr>
@@ -10756,6 +12547,35 @@
           </p:sp>
         </mc:Fallback>
       </mc:AlternateContent>
+      <p:sp>
+        <p:nvSpPr>
+          <p:cNvPr id="4" name="Slide Number Placeholder 3">
+            <a:extLst>
+              <a:ext uri="{FF2B5EF4-FFF2-40B4-BE49-F238E27FC236}">
+                <a16:creationId xmlns:a16="http://schemas.microsoft.com/office/drawing/2014/main" id="{49379F60-95ED-4DD2-B2A6-B9FA9B0F1538}"/>
+              </a:ext>
+            </a:extLst>
+          </p:cNvPr>
+          <p:cNvSpPr>
+            <a:spLocks noGrp="1"/>
+          </p:cNvSpPr>
+          <p:nvPr>
+            <p:ph type="sldNum" sz="quarter" idx="12"/>
+          </p:nvPr>
+        </p:nvSpPr>
+        <p:spPr/>
+        <p:txBody>
+          <a:bodyPr/>
+          <a:lstStyle/>
+          <a:p>
+            <a:fld id="{1CFD15D6-A40B-45EE-A88B-B645EAC7DF78}" type="slidenum">
+              <a:rPr lang="en-US" smtClean="0"/>
+              <a:t>8</a:t>
+            </a:fld>
+            <a:endParaRPr lang="en-US"/>
+          </a:p>
+        </p:txBody>
+      </p:sp>
     </p:spTree>
     <p:extLst>
       <p:ext uri="{BB962C8B-B14F-4D97-AF65-F5344CB8AC3E}">
@@ -10769,7 +12589,7 @@
 </p:sld>
 </file>
 
-<file path=ppt/slides/slide8.xml><?xml version="1.0" encoding="utf-8"?>
+<file path=ppt/slides/slide9.xml><?xml version="1.0" encoding="utf-8"?>
 <p:sld xmlns:a="http://schemas.openxmlformats.org/drawingml/2006/main" xmlns:r="http://schemas.openxmlformats.org/officeDocument/2006/relationships" xmlns:p="http://schemas.openxmlformats.org/presentationml/2006/main">
   <p:cSld>
     <p:spTree>
@@ -10844,7 +12664,7 @@
             </a:pPr>
             <a:r>
               <a:rPr lang="en-US" dirty="0"/>
-              <a:t>Search for minimum objective function in 50 x 50 x 50 grid of evenly spaced points</a:t>
+              <a:t>Search for minimum objective function in 35 x 35 x 35 grid of evenly spaced points</a:t>
             </a:r>
           </a:p>
           <a:p>
@@ -10876,6 +12696,14 @@
               <a:buFont typeface="+mj-lt"/>
               <a:buAutoNum type="alphaLcPeriod"/>
             </a:pPr>
+            <a:r>
+              <a:rPr lang="en-US" dirty="0" err="1"/>
+              <a:t>fminsearch</a:t>
+            </a:r>
+            <a:r>
+              <a:rPr lang="en-US" dirty="0"/>
+              <a:t> uses the </a:t>
+            </a:r>
             <a:r>
               <a:rPr lang="en-US" dirty="0" err="1"/>
               <a:t>Nelder</a:t>
@@ -12166,42 +13994,12 @@
           </a:p>
         </p:txBody>
       </p:sp>
-    </p:spTree>
-    <p:extLst>
-      <p:ext uri="{BB962C8B-B14F-4D97-AF65-F5344CB8AC3E}">
-        <p14:creationId xmlns:p14="http://schemas.microsoft.com/office/powerpoint/2010/main" val="3152053687"/>
-      </p:ext>
-    </p:extLst>
-  </p:cSld>
-  <p:clrMapOvr>
-    <a:masterClrMapping/>
-  </p:clrMapOvr>
-</p:sld>
-</file>
-
-<file path=ppt/slides/slide9.xml><?xml version="1.0" encoding="utf-8"?>
-<p:sld xmlns:a="http://schemas.openxmlformats.org/drawingml/2006/main" xmlns:r="http://schemas.openxmlformats.org/officeDocument/2006/relationships" xmlns:p="http://schemas.openxmlformats.org/presentationml/2006/main">
-  <p:cSld>
-    <p:spTree>
-      <p:nvGrpSpPr>
-        <p:cNvPr id="1" name=""/>
-        <p:cNvGrpSpPr/>
-        <p:nvPr/>
-      </p:nvGrpSpPr>
-      <p:grpSpPr>
-        <a:xfrm>
-          <a:off x="0" y="0"/>
-          <a:ext cx="0" cy="0"/>
-          <a:chOff x="0" y="0"/>
-          <a:chExt cx="0" cy="0"/>
-        </a:xfrm>
-      </p:grpSpPr>
       <p:sp>
         <p:nvSpPr>
-          <p:cNvPr id="2" name="Title 1">
+          <p:cNvPr id="4" name="Slide Number Placeholder 3">
             <a:extLst>
               <a:ext uri="{FF2B5EF4-FFF2-40B4-BE49-F238E27FC236}">
-                <a16:creationId xmlns:a16="http://schemas.microsoft.com/office/drawing/2014/main" id="{205C4D7F-2FD4-4530-A462-415927F5E6DB}"/>
+                <a16:creationId xmlns:a16="http://schemas.microsoft.com/office/drawing/2014/main" id="{6FB48EC9-82E6-426A-B72E-34203A476130}"/>
               </a:ext>
             </a:extLst>
           </p:cNvPr>
@@ -12209,7 +14007,7 @@
             <a:spLocks noGrp="1"/>
           </p:cNvSpPr>
           <p:nvPr>
-            <p:ph type="title"/>
+            <p:ph type="sldNum" sz="quarter" idx="12"/>
           </p:nvPr>
         </p:nvSpPr>
         <p:spPr/>
@@ -12217,127 +14015,18 @@
           <a:bodyPr/>
           <a:lstStyle/>
           <a:p>
-            <a:r>
-              <a:rPr lang="en-US" dirty="0"/>
-              <a:t>Limitations</a:t>
-            </a:r>
-          </a:p>
-        </p:txBody>
-      </p:sp>
-      <p:sp>
-        <p:nvSpPr>
-          <p:cNvPr id="3" name="Content Placeholder 2">
-            <a:extLst>
-              <a:ext uri="{FF2B5EF4-FFF2-40B4-BE49-F238E27FC236}">
-                <a16:creationId xmlns:a16="http://schemas.microsoft.com/office/drawing/2014/main" id="{0ED87FD4-D0BD-4585-905B-8EE883AFD86B}"/>
-              </a:ext>
-            </a:extLst>
-          </p:cNvPr>
-          <p:cNvSpPr>
-            <a:spLocks noGrp="1"/>
-          </p:cNvSpPr>
-          <p:nvPr>
-            <p:ph idx="1"/>
-          </p:nvPr>
-        </p:nvSpPr>
-        <p:spPr/>
-        <p:txBody>
-          <a:bodyPr/>
-          <a:lstStyle/>
-          <a:p>
-            <a:pPr>
-              <a:lnSpc>
-                <a:spcPct val="100000"/>
-              </a:lnSpc>
-            </a:pPr>
-            <a:r>
-              <a:rPr lang="en-US" dirty="0"/>
-              <a:t>Slow compared to analytic OD methods</a:t>
-            </a:r>
-          </a:p>
-          <a:p>
-            <a:pPr lvl="1">
-              <a:lnSpc>
-                <a:spcPct val="100000"/>
-              </a:lnSpc>
-            </a:pPr>
-            <a:r>
-              <a:rPr lang="en-US" dirty="0"/>
-              <a:t>6-10 seconds per run, depending on number of measurements</a:t>
-            </a:r>
-          </a:p>
-          <a:p>
-            <a:pPr>
-              <a:lnSpc>
-                <a:spcPct val="100000"/>
-              </a:lnSpc>
-            </a:pPr>
-            <a:r>
-              <a:rPr lang="en-US" dirty="0"/>
-              <a:t>Extreme values need finer search</a:t>
-            </a:r>
-          </a:p>
-          <a:p>
-            <a:pPr lvl="1">
-              <a:lnSpc>
-                <a:spcPct val="100000"/>
-              </a:lnSpc>
-            </a:pPr>
-            <a:r>
-              <a:rPr lang="en-US" dirty="0"/>
-              <a:t>Eccentricity near 0 or 1</a:t>
-            </a:r>
-          </a:p>
-          <a:p>
-            <a:pPr lvl="1">
-              <a:lnSpc>
-                <a:spcPct val="100000"/>
-              </a:lnSpc>
-            </a:pPr>
-            <a:r>
-              <a:rPr lang="en-US" dirty="0"/>
-              <a:t>Mean anomaly span near 0</a:t>
-            </a:r>
-          </a:p>
-          <a:p>
-            <a:pPr>
-              <a:lnSpc>
-                <a:spcPct val="100000"/>
-              </a:lnSpc>
-            </a:pPr>
-            <a:r>
-              <a:rPr lang="en-US" dirty="0"/>
-              <a:t>Elliptic orbits, measurements within 1 orbit period</a:t>
-            </a:r>
-          </a:p>
-          <a:p>
-            <a:pPr lvl="1">
-              <a:lnSpc>
-                <a:spcPct val="100000"/>
-              </a:lnSpc>
-            </a:pPr>
-            <a:r>
-              <a:rPr lang="en-US" dirty="0"/>
-              <a:t>Work in progress – should be easy to fix these</a:t>
-            </a:r>
-          </a:p>
-          <a:p>
-            <a:pPr>
-              <a:lnSpc>
-                <a:spcPct val="100000"/>
-              </a:lnSpc>
-            </a:pPr>
-            <a:r>
-              <a:rPr lang="en-US" dirty="0"/>
-              <a:t>Proof that global min exists and is near true solution?</a:t>
-            </a:r>
+            <a:fld id="{1CFD15D6-A40B-45EE-A88B-B645EAC7DF78}" type="slidenum">
+              <a:rPr lang="en-US" smtClean="0"/>
+              <a:t>9</a:t>
+            </a:fld>
+            <a:endParaRPr lang="en-US"/>
           </a:p>
         </p:txBody>
       </p:sp>
     </p:spTree>
     <p:extLst>
       <p:ext uri="{BB962C8B-B14F-4D97-AF65-F5344CB8AC3E}">
-        <p14:creationId xmlns:p14="http://schemas.microsoft.com/office/powerpoint/2010/main" val="1976062533"/>
+        <p14:creationId xmlns:p14="http://schemas.microsoft.com/office/powerpoint/2010/main" val="3152053687"/>
       </p:ext>
     </p:extLst>
   </p:cSld>

</xml_diff>